<commit_message>
mash posterior and prs scripts
</commit_message>
<xml_diff>
--- a/_PowerPoints/Weight.pptx
+++ b/_PowerPoints/Weight.pptx
@@ -13,27 +13,33 @@
     <p:sldId id="285" r:id="rId7"/>
     <p:sldId id="256" r:id="rId8"/>
     <p:sldId id="263" r:id="rId9"/>
-    <p:sldId id="262" r:id="rId10"/>
-    <p:sldId id="268" r:id="rId11"/>
-    <p:sldId id="257" r:id="rId12"/>
-    <p:sldId id="258" r:id="rId13"/>
-    <p:sldId id="272" r:id="rId14"/>
-    <p:sldId id="259" r:id="rId15"/>
-    <p:sldId id="274" r:id="rId16"/>
-    <p:sldId id="267" r:id="rId17"/>
-    <p:sldId id="270" r:id="rId18"/>
-    <p:sldId id="260" r:id="rId19"/>
-    <p:sldId id="275" r:id="rId20"/>
-    <p:sldId id="261" r:id="rId21"/>
-    <p:sldId id="264" r:id="rId22"/>
-    <p:sldId id="265" r:id="rId23"/>
-    <p:sldId id="266" r:id="rId24"/>
-    <p:sldId id="273" r:id="rId25"/>
-    <p:sldId id="271" r:id="rId26"/>
-    <p:sldId id="277" r:id="rId27"/>
-    <p:sldId id="276" r:id="rId28"/>
-    <p:sldId id="278" r:id="rId29"/>
-    <p:sldId id="279" r:id="rId30"/>
+    <p:sldId id="286" r:id="rId10"/>
+    <p:sldId id="262" r:id="rId11"/>
+    <p:sldId id="287" r:id="rId12"/>
+    <p:sldId id="268" r:id="rId13"/>
+    <p:sldId id="257" r:id="rId14"/>
+    <p:sldId id="288" r:id="rId15"/>
+    <p:sldId id="258" r:id="rId16"/>
+    <p:sldId id="289" r:id="rId17"/>
+    <p:sldId id="272" r:id="rId18"/>
+    <p:sldId id="259" r:id="rId19"/>
+    <p:sldId id="274" r:id="rId20"/>
+    <p:sldId id="267" r:id="rId21"/>
+    <p:sldId id="270" r:id="rId22"/>
+    <p:sldId id="260" r:id="rId23"/>
+    <p:sldId id="290" r:id="rId24"/>
+    <p:sldId id="275" r:id="rId25"/>
+    <p:sldId id="261" r:id="rId26"/>
+    <p:sldId id="264" r:id="rId27"/>
+    <p:sldId id="265" r:id="rId28"/>
+    <p:sldId id="266" r:id="rId29"/>
+    <p:sldId id="291" r:id="rId30"/>
+    <p:sldId id="273" r:id="rId31"/>
+    <p:sldId id="271" r:id="rId32"/>
+    <p:sldId id="277" r:id="rId33"/>
+    <p:sldId id="276" r:id="rId34"/>
+    <p:sldId id="278" r:id="rId35"/>
+    <p:sldId id="279" r:id="rId36"/>
   </p:sldIdLst>
   <p:sldSz cx="12192000" cy="6858000"/>
   <p:notesSz cx="6858000" cy="9144000"/>
@@ -287,7 +293,7 @@
           <a:p>
             <a:fld id="{F9D1F04A-CD55-444F-88A2-FF39FE0403D4}" type="datetimeFigureOut">
               <a:rPr lang="en-US" smtClean="0"/>
-              <a:t>8/11/2021</a:t>
+              <a:t>9/1/2021</a:t>
             </a:fld>
             <a:endParaRPr lang="en-US"/>
           </a:p>
@@ -485,7 +491,7 @@
           <a:p>
             <a:fld id="{F9D1F04A-CD55-444F-88A2-FF39FE0403D4}" type="datetimeFigureOut">
               <a:rPr lang="en-US" smtClean="0"/>
-              <a:t>8/11/2021</a:t>
+              <a:t>9/1/2021</a:t>
             </a:fld>
             <a:endParaRPr lang="en-US"/>
           </a:p>
@@ -693,7 +699,7 @@
           <a:p>
             <a:fld id="{F9D1F04A-CD55-444F-88A2-FF39FE0403D4}" type="datetimeFigureOut">
               <a:rPr lang="en-US" smtClean="0"/>
-              <a:t>8/11/2021</a:t>
+              <a:t>9/1/2021</a:t>
             </a:fld>
             <a:endParaRPr lang="en-US"/>
           </a:p>
@@ -891,7 +897,7 @@
           <a:p>
             <a:fld id="{F9D1F04A-CD55-444F-88A2-FF39FE0403D4}" type="datetimeFigureOut">
               <a:rPr lang="en-US" smtClean="0"/>
-              <a:t>8/11/2021</a:t>
+              <a:t>9/1/2021</a:t>
             </a:fld>
             <a:endParaRPr lang="en-US"/>
           </a:p>
@@ -1166,7 +1172,7 @@
           <a:p>
             <a:fld id="{F9D1F04A-CD55-444F-88A2-FF39FE0403D4}" type="datetimeFigureOut">
               <a:rPr lang="en-US" smtClean="0"/>
-              <a:t>8/11/2021</a:t>
+              <a:t>9/1/2021</a:t>
             </a:fld>
             <a:endParaRPr lang="en-US"/>
           </a:p>
@@ -1431,7 +1437,7 @@
           <a:p>
             <a:fld id="{F9D1F04A-CD55-444F-88A2-FF39FE0403D4}" type="datetimeFigureOut">
               <a:rPr lang="en-US" smtClean="0"/>
-              <a:t>8/11/2021</a:t>
+              <a:t>9/1/2021</a:t>
             </a:fld>
             <a:endParaRPr lang="en-US"/>
           </a:p>
@@ -1843,7 +1849,7 @@
           <a:p>
             <a:fld id="{F9D1F04A-CD55-444F-88A2-FF39FE0403D4}" type="datetimeFigureOut">
               <a:rPr lang="en-US" smtClean="0"/>
-              <a:t>8/11/2021</a:t>
+              <a:t>9/1/2021</a:t>
             </a:fld>
             <a:endParaRPr lang="en-US"/>
           </a:p>
@@ -1984,7 +1990,7 @@
           <a:p>
             <a:fld id="{F9D1F04A-CD55-444F-88A2-FF39FE0403D4}" type="datetimeFigureOut">
               <a:rPr lang="en-US" smtClean="0"/>
-              <a:t>8/11/2021</a:t>
+              <a:t>9/1/2021</a:t>
             </a:fld>
             <a:endParaRPr lang="en-US"/>
           </a:p>
@@ -2097,7 +2103,7 @@
           <a:p>
             <a:fld id="{F9D1F04A-CD55-444F-88A2-FF39FE0403D4}" type="datetimeFigureOut">
               <a:rPr lang="en-US" smtClean="0"/>
-              <a:t>8/11/2021</a:t>
+              <a:t>9/1/2021</a:t>
             </a:fld>
             <a:endParaRPr lang="en-US"/>
           </a:p>
@@ -2408,7 +2414,7 @@
           <a:p>
             <a:fld id="{F9D1F04A-CD55-444F-88A2-FF39FE0403D4}" type="datetimeFigureOut">
               <a:rPr lang="en-US" smtClean="0"/>
-              <a:t>8/11/2021</a:t>
+              <a:t>9/1/2021</a:t>
             </a:fld>
             <a:endParaRPr lang="en-US"/>
           </a:p>
@@ -2696,7 +2702,7 @@
           <a:p>
             <a:fld id="{F9D1F04A-CD55-444F-88A2-FF39FE0403D4}" type="datetimeFigureOut">
               <a:rPr lang="en-US" smtClean="0"/>
-              <a:t>8/11/2021</a:t>
+              <a:t>9/1/2021</a:t>
             </a:fld>
             <a:endParaRPr lang="en-US"/>
           </a:p>
@@ -2937,7 +2943,7 @@
           <a:p>
             <a:fld id="{F9D1F04A-CD55-444F-88A2-FF39FE0403D4}" type="datetimeFigureOut">
               <a:rPr lang="en-US" smtClean="0"/>
-              <a:t>8/11/2021</a:t>
+              <a:t>9/1/2021</a:t>
             </a:fld>
             <a:endParaRPr lang="en-US"/>
           </a:p>
@@ -3419,7 +3425,7 @@
           <p:cNvPr id="2" name="Title 1">
             <a:extLst>
               <a:ext uri="{FF2B5EF4-FFF2-40B4-BE49-F238E27FC236}">
-                <a16:creationId xmlns:a16="http://schemas.microsoft.com/office/drawing/2014/main" id="{DD787020-E921-49CD-98A8-995866A859E1}"/>
+                <a16:creationId xmlns:a16="http://schemas.microsoft.com/office/drawing/2014/main" id="{30602975-9E63-4EB0-8902-6F7194DCA567}"/>
               </a:ext>
             </a:extLst>
           </p:cNvPr>
@@ -3432,152 +3438,63 @@
         </p:nvSpPr>
         <p:spPr>
           <a:xfrm>
-            <a:off x="838200" y="365125"/>
-            <a:ext cx="10515600" cy="868057"/>
-          </a:xfrm>
-        </p:spPr>
-        <p:txBody>
-          <a:bodyPr/>
-          <a:lstStyle/>
-          <a:p>
-            <a:r>
-              <a:rPr lang="en-US" dirty="0"/>
-              <a:t>Blood Pressure</a:t>
-            </a:r>
-          </a:p>
-        </p:txBody>
-      </p:sp>
-      <p:sp>
-        <p:nvSpPr>
-          <p:cNvPr id="3" name="Content Placeholder 2">
-            <a:extLst>
-              <a:ext uri="{FF2B5EF4-FFF2-40B4-BE49-F238E27FC236}">
-                <a16:creationId xmlns:a16="http://schemas.microsoft.com/office/drawing/2014/main" id="{7C9BFD57-93A4-43C6-B319-86EC70C1F200}"/>
-              </a:ext>
-            </a:extLst>
-          </p:cNvPr>
-          <p:cNvSpPr>
-            <a:spLocks noGrp="1"/>
-          </p:cNvSpPr>
-          <p:nvPr>
-            <p:ph idx="1"/>
-          </p:nvPr>
-        </p:nvSpPr>
-        <p:spPr>
-          <a:xfrm>
-            <a:off x="838200" y="1233182"/>
-            <a:ext cx="10515600" cy="5259693"/>
+            <a:off x="838200" y="-244475"/>
+            <a:ext cx="10515600" cy="1325563"/>
           </a:xfrm>
         </p:spPr>
         <p:txBody>
           <a:bodyPr>
-            <a:normAutofit lnSpcReduction="10000"/>
+            <a:normAutofit/>
           </a:bodyPr>
           <a:lstStyle/>
           <a:p>
-            <a:pPr marL="0" indent="0">
-              <a:buNone/>
-            </a:pPr>
-            <a:r>
-              <a:rPr lang="en-US" sz="1800" u="sng" dirty="0">
-                <a:solidFill>
-                  <a:srgbClr val="0563C1"/>
-                </a:solidFill>
-                <a:effectLst/>
-                <a:latin typeface="Calibri" panose="020F0502020204030204" pitchFamily="34" charset="0"/>
-                <a:ea typeface="Yu Mincho" panose="02020400000000000000" pitchFamily="18" charset="-128"/>
-                <a:cs typeface="Times New Roman" panose="02020603050405020304" pitchFamily="18" charset="0"/>
-                <a:hlinkClick r:id="rId2"/>
-              </a:rPr>
-              <a:t>Gender Differences in the Regulation of Blood Pressure | Hypertension (ahajournals.org)</a:t>
-            </a:r>
-            <a:endParaRPr lang="en-US" dirty="0"/>
-          </a:p>
-          <a:p>
-            <a:r>
-              <a:rPr lang="en-US" dirty="0"/>
-              <a:t>Role of testosterone in BP regulation</a:t>
-            </a:r>
-          </a:p>
-          <a:p>
-            <a:pPr lvl="1"/>
-            <a:r>
-              <a:rPr lang="en-US" dirty="0"/>
-              <a:t>positive relationship between testosterone and BP</a:t>
-            </a:r>
-          </a:p>
-          <a:p>
-            <a:pPr lvl="2"/>
-            <a:r>
-              <a:rPr lang="en-US" dirty="0"/>
-              <a:t>Shown with puberty in boys; castration, androgen receptor blockage, and testosterone treatment in rats</a:t>
-            </a:r>
-          </a:p>
-          <a:p>
-            <a:r>
-              <a:rPr lang="en-US" dirty="0"/>
-              <a:t>Kidney and BP</a:t>
-            </a:r>
-          </a:p>
-          <a:p>
-            <a:pPr lvl="1"/>
-            <a:r>
-              <a:rPr lang="en-US" dirty="0"/>
-              <a:t>higher BP and aldosterone levels in male than female</a:t>
-            </a:r>
-          </a:p>
-          <a:p>
-            <a:pPr lvl="1"/>
-            <a:r>
-              <a:rPr lang="en-US" dirty="0"/>
-              <a:t>Long-term increase in BP occurs due to decreased kidney excretion function</a:t>
-            </a:r>
-          </a:p>
-          <a:p>
-            <a:pPr lvl="2"/>
-            <a:r>
-              <a:rPr lang="en-US" dirty="0"/>
-              <a:t>Increase in BP -&gt; increased sodium excretion</a:t>
-            </a:r>
-          </a:p>
-          <a:p>
-            <a:pPr lvl="2"/>
-            <a:r>
-              <a:rPr lang="en-US" dirty="0"/>
-              <a:t>Androgen receptor located in proximal tubule segments (most sodium reabsorption)</a:t>
-            </a:r>
-          </a:p>
-          <a:p>
-            <a:pPr lvl="1"/>
-            <a:r>
-              <a:rPr lang="en-US" dirty="0"/>
-              <a:t>Positive linear correlation between testosterone and plasma renin activity in rats</a:t>
-            </a:r>
-          </a:p>
-          <a:p>
-            <a:pPr lvl="1"/>
-            <a:r>
-              <a:rPr lang="en-US" dirty="0"/>
-              <a:t>Castration in male rats decreases renal angiotensin mRNA, while chronic testosterone treatment increases</a:t>
-            </a:r>
-          </a:p>
-          <a:p>
-            <a:pPr lvl="2"/>
-            <a:r>
-              <a:rPr lang="en-US" dirty="0"/>
-              <a:t>Increases in mRNA copies of renal angiotensin cause increase in BP</a:t>
-            </a:r>
-          </a:p>
-          <a:p>
-            <a:pPr lvl="1"/>
-            <a:endParaRPr lang="en-US" dirty="0"/>
-          </a:p>
-        </p:txBody>
-      </p:sp>
+            <a:r>
+              <a:rPr lang="en-US" sz="3600" dirty="0"/>
+              <a:t>Diastolic Blood Pressure</a:t>
+            </a:r>
+          </a:p>
+        </p:txBody>
+      </p:sp>
+      <p:pic>
+        <p:nvPicPr>
+          <p:cNvPr id="9" name="Picture 8" descr="Chart, bar chart&#10;&#10;Description automatically generated">
+            <a:extLst>
+              <a:ext uri="{FF2B5EF4-FFF2-40B4-BE49-F238E27FC236}">
+                <a16:creationId xmlns:a16="http://schemas.microsoft.com/office/drawing/2014/main" id="{FA1EE28F-C14C-4576-B085-59B461A00E1E}"/>
+              </a:ext>
+            </a:extLst>
+          </p:cNvPr>
+          <p:cNvPicPr>
+            <a:picLocks noChangeAspect="1"/>
+          </p:cNvPicPr>
+          <p:nvPr/>
+        </p:nvPicPr>
+        <p:blipFill>
+          <a:blip r:embed="rId2">
+            <a:extLst>
+              <a:ext uri="{28A0092B-C50C-407E-A947-70E740481C1C}">
+                <a14:useLocalDpi xmlns:a14="http://schemas.microsoft.com/office/drawing/2010/main" val="0"/>
+              </a:ext>
+            </a:extLst>
+          </a:blip>
+          <a:stretch>
+            <a:fillRect/>
+          </a:stretch>
+        </p:blipFill>
+        <p:spPr>
+          <a:xfrm>
+            <a:off x="0" y="762000"/>
+            <a:ext cx="12192000" cy="6096000"/>
+          </a:xfrm>
+          <a:prstGeom prst="rect">
+            <a:avLst/>
+          </a:prstGeom>
+        </p:spPr>
+      </p:pic>
     </p:spTree>
     <p:extLst>
       <p:ext uri="{BB962C8B-B14F-4D97-AF65-F5344CB8AC3E}">
-        <p14:creationId xmlns:p14="http://schemas.microsoft.com/office/powerpoint/2010/main" val="4240017284"/>
+        <p14:creationId xmlns:p14="http://schemas.microsoft.com/office/powerpoint/2010/main" val="777379417"/>
       </p:ext>
     </p:extLst>
   </p:cSld>
@@ -3609,7 +3526,7 @@
           <p:cNvPr id="2" name="Title 1">
             <a:extLst>
               <a:ext uri="{FF2B5EF4-FFF2-40B4-BE49-F238E27FC236}">
-                <a16:creationId xmlns:a16="http://schemas.microsoft.com/office/drawing/2014/main" id="{77013A98-78CC-4F90-98B3-397B5D47AADA}"/>
+                <a16:creationId xmlns:a16="http://schemas.microsoft.com/office/drawing/2014/main" id="{30602975-9E63-4EB0-8902-6F7194DCA567}"/>
               </a:ext>
             </a:extLst>
           </p:cNvPr>
@@ -3622,7 +3539,7 @@
         </p:nvSpPr>
         <p:spPr>
           <a:xfrm>
-            <a:off x="933450" y="-234950"/>
+            <a:off x="838200" y="-244475"/>
             <a:ext cx="10515600" cy="1325563"/>
           </a:xfrm>
         </p:spPr>
@@ -3634,17 +3551,17 @@
           <a:p>
             <a:r>
               <a:rPr lang="en-US" sz="3600" dirty="0"/>
-              <a:t>Arm fat-free mass (L)</a:t>
+              <a:t>Diastolic Blood Pressure - mash</a:t>
             </a:r>
           </a:p>
         </p:txBody>
       </p:sp>
       <p:pic>
         <p:nvPicPr>
-          <p:cNvPr id="13" name="Picture 12" descr="Chart, bar chart&#10;&#10;Description automatically generated">
-            <a:extLst>
-              <a:ext uri="{FF2B5EF4-FFF2-40B4-BE49-F238E27FC236}">
-                <a16:creationId xmlns:a16="http://schemas.microsoft.com/office/drawing/2014/main" id="{BFA0F5A6-FEB2-4EB4-BD25-43D751810C97}"/>
+          <p:cNvPr id="6" name="Picture 5" descr="Chart, bar chart&#10;&#10;Description automatically generated">
+            <a:extLst>
+              <a:ext uri="{FF2B5EF4-FFF2-40B4-BE49-F238E27FC236}">
+                <a16:creationId xmlns:a16="http://schemas.microsoft.com/office/drawing/2014/main" id="{79A5BCB9-8A19-4902-99D2-E823801032E6}"/>
               </a:ext>
             </a:extLst>
           </p:cNvPr>
@@ -3654,21 +3571,15 @@
           <p:nvPr/>
         </p:nvPicPr>
         <p:blipFill>
-          <a:blip r:embed="rId2">
-            <a:extLst>
-              <a:ext uri="{28A0092B-C50C-407E-A947-70E740481C1C}">
-                <a14:useLocalDpi xmlns:a14="http://schemas.microsoft.com/office/drawing/2010/main" val="0"/>
-              </a:ext>
-            </a:extLst>
-          </a:blip>
+          <a:blip r:embed="rId2"/>
           <a:stretch>
             <a:fillRect/>
           </a:stretch>
         </p:blipFill>
         <p:spPr>
           <a:xfrm>
-            <a:off x="0" y="762000"/>
-            <a:ext cx="12192000" cy="6096000"/>
+            <a:off x="0" y="644409"/>
+            <a:ext cx="12192000" cy="6087377"/>
           </a:xfrm>
           <a:prstGeom prst="rect">
             <a:avLst/>
@@ -3678,7 +3589,7 @@
     </p:spTree>
     <p:extLst>
       <p:ext uri="{BB962C8B-B14F-4D97-AF65-F5344CB8AC3E}">
-        <p14:creationId xmlns:p14="http://schemas.microsoft.com/office/powerpoint/2010/main" val="4195251140"/>
+        <p14:creationId xmlns:p14="http://schemas.microsoft.com/office/powerpoint/2010/main" val="983599908"/>
       </p:ext>
     </p:extLst>
   </p:cSld>
@@ -3710,7 +3621,7 @@
           <p:cNvPr id="2" name="Title 1">
             <a:extLst>
               <a:ext uri="{FF2B5EF4-FFF2-40B4-BE49-F238E27FC236}">
-                <a16:creationId xmlns:a16="http://schemas.microsoft.com/office/drawing/2014/main" id="{9E937B60-F22B-4948-8203-C4D5998E6DA6}"/>
+                <a16:creationId xmlns:a16="http://schemas.microsoft.com/office/drawing/2014/main" id="{DD787020-E921-49CD-98A8-995866A859E1}"/>
               </a:ext>
             </a:extLst>
           </p:cNvPr>
@@ -3723,63 +3634,152 @@
         </p:nvSpPr>
         <p:spPr>
           <a:xfrm>
-            <a:off x="838200" y="-263525"/>
-            <a:ext cx="10515600" cy="1325563"/>
+            <a:off x="838200" y="365125"/>
+            <a:ext cx="10515600" cy="868057"/>
+          </a:xfrm>
+        </p:spPr>
+        <p:txBody>
+          <a:bodyPr/>
+          <a:lstStyle/>
+          <a:p>
+            <a:r>
+              <a:rPr lang="en-US" dirty="0"/>
+              <a:t>Blood Pressure</a:t>
+            </a:r>
+          </a:p>
+        </p:txBody>
+      </p:sp>
+      <p:sp>
+        <p:nvSpPr>
+          <p:cNvPr id="3" name="Content Placeholder 2">
+            <a:extLst>
+              <a:ext uri="{FF2B5EF4-FFF2-40B4-BE49-F238E27FC236}">
+                <a16:creationId xmlns:a16="http://schemas.microsoft.com/office/drawing/2014/main" id="{7C9BFD57-93A4-43C6-B319-86EC70C1F200}"/>
+              </a:ext>
+            </a:extLst>
+          </p:cNvPr>
+          <p:cNvSpPr>
+            <a:spLocks noGrp="1"/>
+          </p:cNvSpPr>
+          <p:nvPr>
+            <p:ph idx="1"/>
+          </p:nvPr>
+        </p:nvSpPr>
+        <p:spPr>
+          <a:xfrm>
+            <a:off x="838200" y="1233182"/>
+            <a:ext cx="10515600" cy="5259693"/>
           </a:xfrm>
         </p:spPr>
         <p:txBody>
           <a:bodyPr>
-            <a:normAutofit/>
+            <a:normAutofit lnSpcReduction="10000"/>
           </a:bodyPr>
           <a:lstStyle/>
           <a:p>
-            <a:r>
-              <a:rPr lang="en-US" sz="3600" dirty="0"/>
-              <a:t>Arm fat-free mass (R)</a:t>
-            </a:r>
-          </a:p>
-        </p:txBody>
-      </p:sp>
-      <p:pic>
-        <p:nvPicPr>
-          <p:cNvPr id="11" name="Picture 10" descr="Chart, bar chart&#10;&#10;Description automatically generated">
-            <a:extLst>
-              <a:ext uri="{FF2B5EF4-FFF2-40B4-BE49-F238E27FC236}">
-                <a16:creationId xmlns:a16="http://schemas.microsoft.com/office/drawing/2014/main" id="{AD3F15E2-4AE3-4770-BF39-9018B74B0B6E}"/>
-              </a:ext>
-            </a:extLst>
-          </p:cNvPr>
-          <p:cNvPicPr>
-            <a:picLocks noChangeAspect="1"/>
-          </p:cNvPicPr>
-          <p:nvPr/>
-        </p:nvPicPr>
-        <p:blipFill>
-          <a:blip r:embed="rId2">
-            <a:extLst>
-              <a:ext uri="{28A0092B-C50C-407E-A947-70E740481C1C}">
-                <a14:useLocalDpi xmlns:a14="http://schemas.microsoft.com/office/drawing/2010/main" val="0"/>
-              </a:ext>
-            </a:extLst>
-          </a:blip>
-          <a:stretch>
-            <a:fillRect/>
-          </a:stretch>
-        </p:blipFill>
-        <p:spPr>
-          <a:xfrm>
-            <a:off x="0" y="762000"/>
-            <a:ext cx="12192000" cy="6096000"/>
-          </a:xfrm>
-          <a:prstGeom prst="rect">
-            <a:avLst/>
-          </a:prstGeom>
-        </p:spPr>
-      </p:pic>
+            <a:pPr marL="0" indent="0">
+              <a:buNone/>
+            </a:pPr>
+            <a:r>
+              <a:rPr lang="en-US" sz="1800" u="sng" dirty="0">
+                <a:solidFill>
+                  <a:srgbClr val="0563C1"/>
+                </a:solidFill>
+                <a:effectLst/>
+                <a:latin typeface="Calibri" panose="020F0502020204030204" pitchFamily="34" charset="0"/>
+                <a:ea typeface="Yu Mincho" panose="02020400000000000000" pitchFamily="18" charset="-128"/>
+                <a:cs typeface="Times New Roman" panose="02020603050405020304" pitchFamily="18" charset="0"/>
+                <a:hlinkClick r:id="rId2"/>
+              </a:rPr>
+              <a:t>Gender Differences in the Regulation of Blood Pressure | Hypertension (ahajournals.org)</a:t>
+            </a:r>
+            <a:endParaRPr lang="en-US" dirty="0"/>
+          </a:p>
+          <a:p>
+            <a:r>
+              <a:rPr lang="en-US" dirty="0"/>
+              <a:t>Role of testosterone in BP regulation</a:t>
+            </a:r>
+          </a:p>
+          <a:p>
+            <a:pPr lvl="1"/>
+            <a:r>
+              <a:rPr lang="en-US" dirty="0"/>
+              <a:t>positive relationship between testosterone and BP</a:t>
+            </a:r>
+          </a:p>
+          <a:p>
+            <a:pPr lvl="2"/>
+            <a:r>
+              <a:rPr lang="en-US" dirty="0"/>
+              <a:t>Shown with puberty in boys; castration, androgen receptor blockage, and testosterone treatment in rats</a:t>
+            </a:r>
+          </a:p>
+          <a:p>
+            <a:r>
+              <a:rPr lang="en-US" dirty="0"/>
+              <a:t>Kidney and BP</a:t>
+            </a:r>
+          </a:p>
+          <a:p>
+            <a:pPr lvl="1"/>
+            <a:r>
+              <a:rPr lang="en-US" dirty="0"/>
+              <a:t>higher BP and aldosterone levels in male than female</a:t>
+            </a:r>
+          </a:p>
+          <a:p>
+            <a:pPr lvl="1"/>
+            <a:r>
+              <a:rPr lang="en-US" dirty="0"/>
+              <a:t>Long-term increase in BP occurs due to decreased kidney excretion function</a:t>
+            </a:r>
+          </a:p>
+          <a:p>
+            <a:pPr lvl="2"/>
+            <a:r>
+              <a:rPr lang="en-US" dirty="0"/>
+              <a:t>Increase in BP -&gt; increased sodium excretion</a:t>
+            </a:r>
+          </a:p>
+          <a:p>
+            <a:pPr lvl="2"/>
+            <a:r>
+              <a:rPr lang="en-US" dirty="0"/>
+              <a:t>Androgen receptor located in proximal tubule segments (most sodium reabsorption)</a:t>
+            </a:r>
+          </a:p>
+          <a:p>
+            <a:pPr lvl="1"/>
+            <a:r>
+              <a:rPr lang="en-US" dirty="0"/>
+              <a:t>Positive linear correlation between testosterone and plasma renin activity in rats</a:t>
+            </a:r>
+          </a:p>
+          <a:p>
+            <a:pPr lvl="1"/>
+            <a:r>
+              <a:rPr lang="en-US" dirty="0"/>
+              <a:t>Castration in male rats decreases renal angiotensin mRNA, while chronic testosterone treatment increases</a:t>
+            </a:r>
+          </a:p>
+          <a:p>
+            <a:pPr lvl="2"/>
+            <a:r>
+              <a:rPr lang="en-US" dirty="0"/>
+              <a:t>Increases in mRNA copies of renal angiotensin cause increase in BP</a:t>
+            </a:r>
+          </a:p>
+          <a:p>
+            <a:pPr lvl="1"/>
+            <a:endParaRPr lang="en-US" dirty="0"/>
+          </a:p>
+        </p:txBody>
+      </p:sp>
     </p:spTree>
     <p:extLst>
       <p:ext uri="{BB962C8B-B14F-4D97-AF65-F5344CB8AC3E}">
-        <p14:creationId xmlns:p14="http://schemas.microsoft.com/office/powerpoint/2010/main" val="582879050"/>
+        <p14:creationId xmlns:p14="http://schemas.microsoft.com/office/powerpoint/2010/main" val="4240017284"/>
       </p:ext>
     </p:extLst>
   </p:cSld>
@@ -3811,7 +3811,7 @@
           <p:cNvPr id="2" name="Title 1">
             <a:extLst>
               <a:ext uri="{FF2B5EF4-FFF2-40B4-BE49-F238E27FC236}">
-                <a16:creationId xmlns:a16="http://schemas.microsoft.com/office/drawing/2014/main" id="{0E14A9D8-5D6E-4BCF-A9BB-D46398188AE0}"/>
+                <a16:creationId xmlns:a16="http://schemas.microsoft.com/office/drawing/2014/main" id="{77013A98-78CC-4F90-98B3-397B5D47AADA}"/>
               </a:ext>
             </a:extLst>
           </p:cNvPr>
@@ -3822,50 +3822,65 @@
             <p:ph type="title"/>
           </p:nvPr>
         </p:nvSpPr>
-        <p:spPr/>
-        <p:txBody>
-          <a:bodyPr/>
+        <p:spPr>
+          <a:xfrm>
+            <a:off x="933450" y="-234950"/>
+            <a:ext cx="10515600" cy="1325563"/>
+          </a:xfrm>
+        </p:spPr>
+        <p:txBody>
+          <a:bodyPr>
+            <a:normAutofit/>
+          </a:bodyPr>
           <a:lstStyle/>
           <a:p>
             <a:r>
-              <a:rPr lang="en-US" dirty="0"/>
-              <a:t>Lean Mass</a:t>
-            </a:r>
-          </a:p>
-        </p:txBody>
-      </p:sp>
-      <p:sp>
-        <p:nvSpPr>
-          <p:cNvPr id="3" name="Content Placeholder 2">
-            <a:extLst>
-              <a:ext uri="{FF2B5EF4-FFF2-40B4-BE49-F238E27FC236}">
-                <a16:creationId xmlns:a16="http://schemas.microsoft.com/office/drawing/2014/main" id="{B782E40F-7038-4173-8CF8-020FEA4EA80D}"/>
-              </a:ext>
-            </a:extLst>
-          </p:cNvPr>
-          <p:cNvSpPr>
-            <a:spLocks noGrp="1"/>
-          </p:cNvSpPr>
-          <p:nvPr>
-            <p:ph idx="1"/>
-          </p:nvPr>
-        </p:nvSpPr>
-        <p:spPr/>
-        <p:txBody>
-          <a:bodyPr/>
-          <a:lstStyle/>
-          <a:p>
-            <a:r>
-              <a:rPr lang="en-US" dirty="0"/>
-              <a:t>Both testosterone and estrogen have anabolic effects on lean mass (skeletal muscle and bone); have different pathways</a:t>
-            </a:r>
-          </a:p>
-        </p:txBody>
-      </p:sp>
+              <a:rPr lang="en-US" sz="3600" dirty="0"/>
+              <a:t>Arm fat-free mass (L)</a:t>
+            </a:r>
+          </a:p>
+        </p:txBody>
+      </p:sp>
+      <p:pic>
+        <p:nvPicPr>
+          <p:cNvPr id="13" name="Picture 12" descr="Chart, bar chart&#10;&#10;Description automatically generated">
+            <a:extLst>
+              <a:ext uri="{FF2B5EF4-FFF2-40B4-BE49-F238E27FC236}">
+                <a16:creationId xmlns:a16="http://schemas.microsoft.com/office/drawing/2014/main" id="{BFA0F5A6-FEB2-4EB4-BD25-43D751810C97}"/>
+              </a:ext>
+            </a:extLst>
+          </p:cNvPr>
+          <p:cNvPicPr>
+            <a:picLocks noChangeAspect="1"/>
+          </p:cNvPicPr>
+          <p:nvPr/>
+        </p:nvPicPr>
+        <p:blipFill>
+          <a:blip r:embed="rId2">
+            <a:extLst>
+              <a:ext uri="{28A0092B-C50C-407E-A947-70E740481C1C}">
+                <a14:useLocalDpi xmlns:a14="http://schemas.microsoft.com/office/drawing/2010/main" val="0"/>
+              </a:ext>
+            </a:extLst>
+          </a:blip>
+          <a:stretch>
+            <a:fillRect/>
+          </a:stretch>
+        </p:blipFill>
+        <p:spPr>
+          <a:xfrm>
+            <a:off x="0" y="762000"/>
+            <a:ext cx="12192000" cy="6096000"/>
+          </a:xfrm>
+          <a:prstGeom prst="rect">
+            <a:avLst/>
+          </a:prstGeom>
+        </p:spPr>
+      </p:pic>
     </p:spTree>
     <p:extLst>
       <p:ext uri="{BB962C8B-B14F-4D97-AF65-F5344CB8AC3E}">
-        <p14:creationId xmlns:p14="http://schemas.microsoft.com/office/powerpoint/2010/main" val="438795725"/>
+        <p14:creationId xmlns:p14="http://schemas.microsoft.com/office/powerpoint/2010/main" val="4195251140"/>
       </p:ext>
     </p:extLst>
   </p:cSld>
@@ -3897,7 +3912,7 @@
           <p:cNvPr id="2" name="Title 1">
             <a:extLst>
               <a:ext uri="{FF2B5EF4-FFF2-40B4-BE49-F238E27FC236}">
-                <a16:creationId xmlns:a16="http://schemas.microsoft.com/office/drawing/2014/main" id="{A4269A9E-7F4D-4350-A422-50ED5A1B6409}"/>
+                <a16:creationId xmlns:a16="http://schemas.microsoft.com/office/drawing/2014/main" id="{77013A98-78CC-4F90-98B3-397B5D47AADA}"/>
               </a:ext>
             </a:extLst>
           </p:cNvPr>
@@ -3910,7 +3925,7 @@
         </p:nvSpPr>
         <p:spPr>
           <a:xfrm>
-            <a:off x="838200" y="-234950"/>
+            <a:off x="933450" y="-234950"/>
             <a:ext cx="10515600" cy="1325563"/>
           </a:xfrm>
         </p:spPr>
@@ -3922,17 +3937,17 @@
           <a:p>
             <a:r>
               <a:rPr lang="en-US" sz="3600" dirty="0"/>
-              <a:t>Weight – Cell Types</a:t>
+              <a:t>Arm fat-free mass (L) - mash</a:t>
             </a:r>
           </a:p>
         </p:txBody>
       </p:sp>
       <p:pic>
         <p:nvPicPr>
-          <p:cNvPr id="11" name="Picture 10" descr="Chart, bar chart&#10;&#10;Description automatically generated">
-            <a:extLst>
-              <a:ext uri="{FF2B5EF4-FFF2-40B4-BE49-F238E27FC236}">
-                <a16:creationId xmlns:a16="http://schemas.microsoft.com/office/drawing/2014/main" id="{B0600900-E6B0-4AE5-A301-139FD61B3EBA}"/>
+          <p:cNvPr id="4" name="Picture 3" descr="Chart, bar chart&#10;&#10;Description automatically generated">
+            <a:extLst>
+              <a:ext uri="{FF2B5EF4-FFF2-40B4-BE49-F238E27FC236}">
+                <a16:creationId xmlns:a16="http://schemas.microsoft.com/office/drawing/2014/main" id="{E6EC515B-3F64-4317-BC01-31E9A7C9EF2E}"/>
               </a:ext>
             </a:extLst>
           </p:cNvPr>
@@ -3942,21 +3957,15 @@
           <p:nvPr/>
         </p:nvPicPr>
         <p:blipFill>
-          <a:blip r:embed="rId2">
-            <a:extLst>
-              <a:ext uri="{28A0092B-C50C-407E-A947-70E740481C1C}">
-                <a14:useLocalDpi xmlns:a14="http://schemas.microsoft.com/office/drawing/2010/main" val="0"/>
-              </a:ext>
-            </a:extLst>
-          </a:blip>
+          <a:blip r:embed="rId2"/>
           <a:stretch>
             <a:fillRect/>
           </a:stretch>
         </p:blipFill>
         <p:spPr>
           <a:xfrm>
-            <a:off x="0" y="762000"/>
-            <a:ext cx="12192000" cy="6096000"/>
+            <a:off x="0" y="669174"/>
+            <a:ext cx="12192000" cy="6078779"/>
           </a:xfrm>
           <a:prstGeom prst="rect">
             <a:avLst/>
@@ -3966,7 +3975,7 @@
     </p:spTree>
     <p:extLst>
       <p:ext uri="{BB962C8B-B14F-4D97-AF65-F5344CB8AC3E}">
-        <p14:creationId xmlns:p14="http://schemas.microsoft.com/office/powerpoint/2010/main" val="2671633264"/>
+        <p14:creationId xmlns:p14="http://schemas.microsoft.com/office/powerpoint/2010/main" val="2273296083"/>
       </p:ext>
     </p:extLst>
   </p:cSld>
@@ -3998,7 +4007,7 @@
           <p:cNvPr id="2" name="Title 1">
             <a:extLst>
               <a:ext uri="{FF2B5EF4-FFF2-40B4-BE49-F238E27FC236}">
-                <a16:creationId xmlns:a16="http://schemas.microsoft.com/office/drawing/2014/main" id="{2A052770-8214-4F67-A4AF-9B600FA3CAD0}"/>
+                <a16:creationId xmlns:a16="http://schemas.microsoft.com/office/drawing/2014/main" id="{9E937B60-F22B-4948-8203-C4D5998E6DA6}"/>
               </a:ext>
             </a:extLst>
           </p:cNvPr>
@@ -4011,8 +4020,8 @@
         </p:nvSpPr>
         <p:spPr>
           <a:xfrm>
-            <a:off x="838200" y="0"/>
-            <a:ext cx="10515600" cy="752475"/>
+            <a:off x="838200" y="-263525"/>
+            <a:ext cx="10515600" cy="1325563"/>
           </a:xfrm>
         </p:spPr>
         <p:txBody>
@@ -4023,34 +4032,24 @@
           <a:p>
             <a:r>
               <a:rPr lang="en-US" sz="3600" dirty="0"/>
-              <a:t>Weight – </a:t>
-            </a:r>
-            <a:r>
-              <a:rPr lang="en-US" sz="3600" dirty="0" err="1"/>
-              <a:t>GTEx</a:t>
-            </a:r>
-            <a:r>
-              <a:rPr lang="en-US" sz="3600" dirty="0"/>
-              <a:t> </a:t>
+              <a:t>Arm fat-free mass (R)</a:t>
             </a:r>
           </a:p>
         </p:txBody>
       </p:sp>
       <p:pic>
         <p:nvPicPr>
-          <p:cNvPr id="5" name="Content Placeholder 4" descr="Chart, bar chart&#10;&#10;Description automatically generated">
-            <a:extLst>
-              <a:ext uri="{FF2B5EF4-FFF2-40B4-BE49-F238E27FC236}">
-                <a16:creationId xmlns:a16="http://schemas.microsoft.com/office/drawing/2014/main" id="{7B1286A3-6417-4A09-86AD-503EE9FB4856}"/>
+          <p:cNvPr id="11" name="Picture 10" descr="Chart, bar chart&#10;&#10;Description automatically generated">
+            <a:extLst>
+              <a:ext uri="{FF2B5EF4-FFF2-40B4-BE49-F238E27FC236}">
+                <a16:creationId xmlns:a16="http://schemas.microsoft.com/office/drawing/2014/main" id="{AD3F15E2-4AE3-4770-BF39-9018B74B0B6E}"/>
               </a:ext>
             </a:extLst>
           </p:cNvPr>
           <p:cNvPicPr>
-            <a:picLocks noGrp="1" noChangeAspect="1"/>
+            <a:picLocks noChangeAspect="1"/>
           </p:cNvPicPr>
-          <p:nvPr>
-            <p:ph idx="1"/>
-          </p:nvPr>
+          <p:nvPr/>
         </p:nvPicPr>
         <p:blipFill>
           <a:blip r:embed="rId2">
@@ -4069,12 +4068,15 @@
             <a:off x="0" y="762000"/>
             <a:ext cx="12192000" cy="6096000"/>
           </a:xfrm>
+          <a:prstGeom prst="rect">
+            <a:avLst/>
+          </a:prstGeom>
         </p:spPr>
       </p:pic>
     </p:spTree>
     <p:extLst>
       <p:ext uri="{BB962C8B-B14F-4D97-AF65-F5344CB8AC3E}">
-        <p14:creationId xmlns:p14="http://schemas.microsoft.com/office/powerpoint/2010/main" val="363196008"/>
+        <p14:creationId xmlns:p14="http://schemas.microsoft.com/office/powerpoint/2010/main" val="582879050"/>
       </p:ext>
     </p:extLst>
   </p:cSld>
@@ -4106,7 +4108,7 @@
           <p:cNvPr id="2" name="Title 1">
             <a:extLst>
               <a:ext uri="{FF2B5EF4-FFF2-40B4-BE49-F238E27FC236}">
-                <a16:creationId xmlns:a16="http://schemas.microsoft.com/office/drawing/2014/main" id="{324088ED-6BCE-4C99-BBFE-360F9690B6D3}"/>
+                <a16:creationId xmlns:a16="http://schemas.microsoft.com/office/drawing/2014/main" id="{9E937B60-F22B-4948-8203-C4D5998E6DA6}"/>
               </a:ext>
             </a:extLst>
           </p:cNvPr>
@@ -4119,7 +4121,7 @@
         </p:nvSpPr>
         <p:spPr>
           <a:xfrm>
-            <a:off x="838200" y="-210045"/>
+            <a:off x="838200" y="-263525"/>
             <a:ext cx="10515600" cy="1325563"/>
           </a:xfrm>
         </p:spPr>
@@ -4131,17 +4133,17 @@
           <a:p>
             <a:r>
               <a:rPr lang="en-US" sz="3600" dirty="0"/>
-              <a:t>Whole Body Fat Mass</a:t>
+              <a:t>Arm fat-free mass (R) - mash</a:t>
             </a:r>
           </a:p>
         </p:txBody>
       </p:sp>
       <p:pic>
         <p:nvPicPr>
-          <p:cNvPr id="11" name="Picture 10" descr="Chart, bar chart&#10;&#10;Description automatically generated">
-            <a:extLst>
-              <a:ext uri="{FF2B5EF4-FFF2-40B4-BE49-F238E27FC236}">
-                <a16:creationId xmlns:a16="http://schemas.microsoft.com/office/drawing/2014/main" id="{2596D4E0-3A77-4AF3-9F6D-58927B3F100F}"/>
+          <p:cNvPr id="4" name="Picture 3">
+            <a:extLst>
+              <a:ext uri="{FF2B5EF4-FFF2-40B4-BE49-F238E27FC236}">
+                <a16:creationId xmlns:a16="http://schemas.microsoft.com/office/drawing/2014/main" id="{24BEC75B-D241-4799-80A1-2071EB9C13A4}"/>
               </a:ext>
             </a:extLst>
           </p:cNvPr>
@@ -4151,21 +4153,15 @@
           <p:nvPr/>
         </p:nvPicPr>
         <p:blipFill>
-          <a:blip r:embed="rId2">
-            <a:extLst>
-              <a:ext uri="{28A0092B-C50C-407E-A947-70E740481C1C}">
-                <a14:useLocalDpi xmlns:a14="http://schemas.microsoft.com/office/drawing/2010/main" val="0"/>
-              </a:ext>
-            </a:extLst>
-          </a:blip>
+          <a:blip r:embed="rId2"/>
           <a:stretch>
             <a:fillRect/>
           </a:stretch>
         </p:blipFill>
         <p:spPr>
           <a:xfrm>
-            <a:off x="0" y="762000"/>
-            <a:ext cx="12192000" cy="6096000"/>
+            <a:off x="0" y="689494"/>
+            <a:ext cx="12162739" cy="6077065"/>
           </a:xfrm>
           <a:prstGeom prst="rect">
             <a:avLst/>
@@ -4175,7 +4171,7 @@
     </p:spTree>
     <p:extLst>
       <p:ext uri="{BB962C8B-B14F-4D97-AF65-F5344CB8AC3E}">
-        <p14:creationId xmlns:p14="http://schemas.microsoft.com/office/powerpoint/2010/main" val="3702876409"/>
+        <p14:creationId xmlns:p14="http://schemas.microsoft.com/office/powerpoint/2010/main" val="1162183555"/>
       </p:ext>
     </p:extLst>
   </p:cSld>
@@ -4207,7 +4203,7 @@
           <p:cNvPr id="2" name="Title 1">
             <a:extLst>
               <a:ext uri="{FF2B5EF4-FFF2-40B4-BE49-F238E27FC236}">
-                <a16:creationId xmlns:a16="http://schemas.microsoft.com/office/drawing/2014/main" id="{029EDF97-0F1B-4BBF-9410-195A37208D03}"/>
+                <a16:creationId xmlns:a16="http://schemas.microsoft.com/office/drawing/2014/main" id="{0E14A9D8-5D6E-4BCF-A9BB-D46398188AE0}"/>
               </a:ext>
             </a:extLst>
           </p:cNvPr>
@@ -4225,7 +4221,7 @@
           <a:p>
             <a:r>
               <a:rPr lang="en-US" dirty="0"/>
-              <a:t>Estrogen and Fat</a:t>
+              <a:t>Lean Mass</a:t>
             </a:r>
           </a:p>
         </p:txBody>
@@ -4235,7 +4231,7 @@
           <p:cNvPr id="3" name="Content Placeholder 2">
             <a:extLst>
               <a:ext uri="{FF2B5EF4-FFF2-40B4-BE49-F238E27FC236}">
-                <a16:creationId xmlns:a16="http://schemas.microsoft.com/office/drawing/2014/main" id="{42A7DB7C-D174-4C64-9179-48267AE8CECF}"/>
+                <a16:creationId xmlns:a16="http://schemas.microsoft.com/office/drawing/2014/main" id="{B782E40F-7038-4173-8CF8-020FEA4EA80D}"/>
               </a:ext>
             </a:extLst>
           </p:cNvPr>
@@ -4246,84 +4242,14 @@
             <p:ph idx="1"/>
           </p:nvPr>
         </p:nvSpPr>
-        <p:spPr>
-          <a:xfrm>
-            <a:off x="838200" y="1690687"/>
-            <a:ext cx="10705051" cy="4802187"/>
-          </a:xfrm>
-        </p:spPr>
-        <p:txBody>
-          <a:bodyPr>
-            <a:normAutofit lnSpcReduction="10000"/>
-          </a:bodyPr>
+        <p:spPr/>
+        <p:txBody>
+          <a:bodyPr/>
           <a:lstStyle/>
           <a:p>
-            <a:pPr marL="0" indent="0">
-              <a:buNone/>
-            </a:pPr>
-            <a:r>
-              <a:rPr lang="en-US" dirty="0">
-                <a:hlinkClick r:id="rId2"/>
-              </a:rPr>
-              <a:t>Sex Differences in Regulation of Body Weight</a:t>
-            </a:r>
             <a:r>
               <a:rPr lang="en-US" dirty="0"/>
-              <a:t>	</a:t>
-            </a:r>
-          </a:p>
-          <a:p>
-            <a:r>
-              <a:rPr lang="en-US" dirty="0"/>
-              <a:t>Inverse relationship between estrogen levels and food intake</a:t>
-            </a:r>
-          </a:p>
-          <a:p>
-            <a:pPr lvl="1"/>
-            <a:r>
-              <a:rPr lang="en-US" dirty="0"/>
-              <a:t>Estrogen and leptin have overlapping target nuclei</a:t>
-            </a:r>
-          </a:p>
-          <a:p>
-            <a:r>
-              <a:rPr lang="en-US" dirty="0"/>
-              <a:t>Leptin levels higher in females compared to males, independent of body composition</a:t>
-            </a:r>
-          </a:p>
-          <a:p>
-            <a:pPr lvl="1"/>
-            <a:r>
-              <a:rPr lang="en-US" dirty="0"/>
-              <a:t>Increased subcutaneous fat in females vs males</a:t>
-            </a:r>
-          </a:p>
-          <a:p>
-            <a:pPr lvl="2"/>
-            <a:r>
-              <a:rPr lang="en-US" dirty="0"/>
-              <a:t>Estrogen increase lipolysis for visceral fat specifically, increasing fat in subcutaneous region</a:t>
-            </a:r>
-          </a:p>
-          <a:p>
-            <a:pPr lvl="1"/>
-            <a:r>
-              <a:rPr lang="en-US" dirty="0"/>
-              <a:t>Leptin levels inversely correlated with testosterone, positively correlated with estrogen</a:t>
-            </a:r>
-          </a:p>
-          <a:p>
-            <a:pPr lvl="1"/>
-            <a:r>
-              <a:rPr lang="en-US" dirty="0"/>
-              <a:t>In obese and aging men, there is increase conversion of testosterone to estrogen -&gt; association with increased leptin</a:t>
-            </a:r>
-          </a:p>
-          <a:p>
-            <a:pPr lvl="1"/>
-            <a:r>
-              <a:rPr lang="en-US" dirty="0"/>
-              <a:t>leptin activates sympathetic nervous system</a:t>
+              <a:t>Both testosterone and estrogen have anabolic effects on lean mass (skeletal muscle and bone); have different pathways</a:t>
             </a:r>
           </a:p>
         </p:txBody>
@@ -4331,7 +4257,7 @@
     </p:spTree>
     <p:extLst>
       <p:ext uri="{BB962C8B-B14F-4D97-AF65-F5344CB8AC3E}">
-        <p14:creationId xmlns:p14="http://schemas.microsoft.com/office/powerpoint/2010/main" val="2621268212"/>
+        <p14:creationId xmlns:p14="http://schemas.microsoft.com/office/powerpoint/2010/main" val="438795725"/>
       </p:ext>
     </p:extLst>
   </p:cSld>
@@ -4363,7 +4289,7 @@
           <p:cNvPr id="2" name="Title 1">
             <a:extLst>
               <a:ext uri="{FF2B5EF4-FFF2-40B4-BE49-F238E27FC236}">
-                <a16:creationId xmlns:a16="http://schemas.microsoft.com/office/drawing/2014/main" id="{6C49716E-7F67-4809-A2CC-9E4E655F03AB}"/>
+                <a16:creationId xmlns:a16="http://schemas.microsoft.com/office/drawing/2014/main" id="{A4269A9E-7F4D-4350-A422-50ED5A1B6409}"/>
               </a:ext>
             </a:extLst>
           </p:cNvPr>
@@ -4376,7 +4302,7 @@
         </p:nvSpPr>
         <p:spPr>
           <a:xfrm>
-            <a:off x="838200" y="-297657"/>
+            <a:off x="838200" y="-234950"/>
             <a:ext cx="10515600" cy="1325563"/>
           </a:xfrm>
         </p:spPr>
@@ -4388,17 +4314,17 @@
           <a:p>
             <a:r>
               <a:rPr lang="en-US" sz="3600" dirty="0"/>
-              <a:t>BMI – Cell Types</a:t>
+              <a:t>Weight – Cell Types</a:t>
             </a:r>
           </a:p>
         </p:txBody>
       </p:sp>
       <p:pic>
         <p:nvPicPr>
-          <p:cNvPr id="9" name="Picture 8" descr="Chart, bar chart&#10;&#10;Description automatically generated">
-            <a:extLst>
-              <a:ext uri="{FF2B5EF4-FFF2-40B4-BE49-F238E27FC236}">
-                <a16:creationId xmlns:a16="http://schemas.microsoft.com/office/drawing/2014/main" id="{6D0FDFD0-A286-4A6A-9C49-494A176BE2A7}"/>
+          <p:cNvPr id="11" name="Picture 10" descr="Chart, bar chart&#10;&#10;Description automatically generated">
+            <a:extLst>
+              <a:ext uri="{FF2B5EF4-FFF2-40B4-BE49-F238E27FC236}">
+                <a16:creationId xmlns:a16="http://schemas.microsoft.com/office/drawing/2014/main" id="{B0600900-E6B0-4AE5-A301-139FD61B3EBA}"/>
               </a:ext>
             </a:extLst>
           </p:cNvPr>
@@ -4432,7 +4358,7 @@
     </p:spTree>
     <p:extLst>
       <p:ext uri="{BB962C8B-B14F-4D97-AF65-F5344CB8AC3E}">
-        <p14:creationId xmlns:p14="http://schemas.microsoft.com/office/powerpoint/2010/main" val="3679050632"/>
+        <p14:creationId xmlns:p14="http://schemas.microsoft.com/office/powerpoint/2010/main" val="2671633264"/>
       </p:ext>
     </p:extLst>
   </p:cSld>
@@ -4464,7 +4390,7 @@
           <p:cNvPr id="2" name="Title 1">
             <a:extLst>
               <a:ext uri="{FF2B5EF4-FFF2-40B4-BE49-F238E27FC236}">
-                <a16:creationId xmlns:a16="http://schemas.microsoft.com/office/drawing/2014/main" id="{A6C22298-89A6-4CD0-A61A-856C5993BF45}"/>
+                <a16:creationId xmlns:a16="http://schemas.microsoft.com/office/drawing/2014/main" id="{2A052770-8214-4F67-A4AF-9B600FA3CAD0}"/>
               </a:ext>
             </a:extLst>
           </p:cNvPr>
@@ -4478,7 +4404,7 @@
         <p:spPr>
           <a:xfrm>
             <a:off x="838200" y="0"/>
-            <a:ext cx="10515600" cy="724766"/>
+            <a:ext cx="10515600" cy="752475"/>
           </a:xfrm>
         </p:spPr>
         <p:txBody>
@@ -4489,13 +4415,16 @@
           <a:p>
             <a:r>
               <a:rPr lang="en-US" sz="3600" dirty="0"/>
-              <a:t>BMI - </a:t>
+              <a:t>Weight – </a:t>
             </a:r>
             <a:r>
               <a:rPr lang="en-US" sz="3600" dirty="0" err="1"/>
               <a:t>GTEx</a:t>
             </a:r>
-            <a:endParaRPr lang="en-US" sz="3600" dirty="0"/>
+            <a:r>
+              <a:rPr lang="en-US" sz="3600" dirty="0"/>
+              <a:t> </a:t>
+            </a:r>
           </a:p>
         </p:txBody>
       </p:sp>
@@ -4504,7 +4433,7 @@
           <p:cNvPr id="5" name="Content Placeholder 4" descr="Chart, bar chart&#10;&#10;Description automatically generated">
             <a:extLst>
               <a:ext uri="{FF2B5EF4-FFF2-40B4-BE49-F238E27FC236}">
-                <a16:creationId xmlns:a16="http://schemas.microsoft.com/office/drawing/2014/main" id="{D5F1C85C-61EC-4ADE-9D48-9419FC05BF0E}"/>
+                <a16:creationId xmlns:a16="http://schemas.microsoft.com/office/drawing/2014/main" id="{7B1286A3-6417-4A09-86AD-503EE9FB4856}"/>
               </a:ext>
             </a:extLst>
           </p:cNvPr>
@@ -4537,7 +4466,7 @@
     </p:spTree>
     <p:extLst>
       <p:ext uri="{BB962C8B-B14F-4D97-AF65-F5344CB8AC3E}">
-        <p14:creationId xmlns:p14="http://schemas.microsoft.com/office/powerpoint/2010/main" val="74754745"/>
+        <p14:creationId xmlns:p14="http://schemas.microsoft.com/office/powerpoint/2010/main" val="363196008"/>
       </p:ext>
     </p:extLst>
   </p:cSld>
@@ -4629,7 +4558,7 @@
           <p:cNvPr id="2" name="Title 1">
             <a:extLst>
               <a:ext uri="{FF2B5EF4-FFF2-40B4-BE49-F238E27FC236}">
-                <a16:creationId xmlns:a16="http://schemas.microsoft.com/office/drawing/2014/main" id="{CE796253-6CC5-4122-8171-3A9B6CE67B7D}"/>
+                <a16:creationId xmlns:a16="http://schemas.microsoft.com/office/drawing/2014/main" id="{324088ED-6BCE-4C99-BBFE-360F9690B6D3}"/>
               </a:ext>
             </a:extLst>
           </p:cNvPr>
@@ -4642,7 +4571,7 @@
         </p:nvSpPr>
         <p:spPr>
           <a:xfrm>
-            <a:off x="838200" y="-254000"/>
+            <a:off x="838200" y="-210045"/>
             <a:ext cx="10515600" cy="1325563"/>
           </a:xfrm>
         </p:spPr>
@@ -4654,17 +4583,17 @@
           <a:p>
             <a:r>
               <a:rPr lang="en-US" sz="3600" dirty="0"/>
-              <a:t>Hip Circumference</a:t>
+              <a:t>Whole Body Fat Mass</a:t>
             </a:r>
           </a:p>
         </p:txBody>
       </p:sp>
       <p:pic>
         <p:nvPicPr>
-          <p:cNvPr id="9" name="Picture 8" descr="Chart, bar chart&#10;&#10;Description automatically generated">
-            <a:extLst>
-              <a:ext uri="{FF2B5EF4-FFF2-40B4-BE49-F238E27FC236}">
-                <a16:creationId xmlns:a16="http://schemas.microsoft.com/office/drawing/2014/main" id="{6BAB60FB-8EDB-4F2C-B75D-B4B68ED161B0}"/>
+          <p:cNvPr id="11" name="Picture 10" descr="Chart, bar chart&#10;&#10;Description automatically generated">
+            <a:extLst>
+              <a:ext uri="{FF2B5EF4-FFF2-40B4-BE49-F238E27FC236}">
+                <a16:creationId xmlns:a16="http://schemas.microsoft.com/office/drawing/2014/main" id="{2596D4E0-3A77-4AF3-9F6D-58927B3F100F}"/>
               </a:ext>
             </a:extLst>
           </p:cNvPr>
@@ -4698,7 +4627,7 @@
     </p:spTree>
     <p:extLst>
       <p:ext uri="{BB962C8B-B14F-4D97-AF65-F5344CB8AC3E}">
-        <p14:creationId xmlns:p14="http://schemas.microsoft.com/office/powerpoint/2010/main" val="1232925332"/>
+        <p14:creationId xmlns:p14="http://schemas.microsoft.com/office/powerpoint/2010/main" val="3702876409"/>
       </p:ext>
     </p:extLst>
   </p:cSld>
@@ -4730,7 +4659,7 @@
           <p:cNvPr id="2" name="Title 1">
             <a:extLst>
               <a:ext uri="{FF2B5EF4-FFF2-40B4-BE49-F238E27FC236}">
-                <a16:creationId xmlns:a16="http://schemas.microsoft.com/office/drawing/2014/main" id="{CE796253-6CC5-4122-8171-3A9B6CE67B7D}"/>
+                <a16:creationId xmlns:a16="http://schemas.microsoft.com/office/drawing/2014/main" id="{029EDF97-0F1B-4BBF-9410-195A37208D03}"/>
               </a:ext>
             </a:extLst>
           </p:cNvPr>
@@ -4741,65 +4670,120 @@
             <p:ph type="title"/>
           </p:nvPr>
         </p:nvSpPr>
-        <p:spPr>
-          <a:xfrm>
-            <a:off x="838200" y="-349250"/>
-            <a:ext cx="10515600" cy="1325563"/>
+        <p:spPr/>
+        <p:txBody>
+          <a:bodyPr/>
+          <a:lstStyle/>
+          <a:p>
+            <a:r>
+              <a:rPr lang="en-US" dirty="0"/>
+              <a:t>Estrogen and Fat</a:t>
+            </a:r>
+          </a:p>
+        </p:txBody>
+      </p:sp>
+      <p:sp>
+        <p:nvSpPr>
+          <p:cNvPr id="3" name="Content Placeholder 2">
+            <a:extLst>
+              <a:ext uri="{FF2B5EF4-FFF2-40B4-BE49-F238E27FC236}">
+                <a16:creationId xmlns:a16="http://schemas.microsoft.com/office/drawing/2014/main" id="{42A7DB7C-D174-4C64-9179-48267AE8CECF}"/>
+              </a:ext>
+            </a:extLst>
+          </p:cNvPr>
+          <p:cNvSpPr>
+            <a:spLocks noGrp="1"/>
+          </p:cNvSpPr>
+          <p:nvPr>
+            <p:ph idx="1"/>
+          </p:nvPr>
+        </p:nvSpPr>
+        <p:spPr>
+          <a:xfrm>
+            <a:off x="838200" y="1690687"/>
+            <a:ext cx="10705051" cy="4802187"/>
           </a:xfrm>
         </p:spPr>
         <p:txBody>
           <a:bodyPr>
-            <a:normAutofit/>
+            <a:normAutofit lnSpcReduction="10000"/>
           </a:bodyPr>
           <a:lstStyle/>
           <a:p>
-            <a:r>
-              <a:rPr lang="en-US" sz="3600" dirty="0"/>
-              <a:t>Waist Circumference</a:t>
-            </a:r>
-          </a:p>
-        </p:txBody>
-      </p:sp>
-      <p:pic>
-        <p:nvPicPr>
-          <p:cNvPr id="11" name="Picture 10" descr="Chart, bar chart&#10;&#10;Description automatically generated">
-            <a:extLst>
-              <a:ext uri="{FF2B5EF4-FFF2-40B4-BE49-F238E27FC236}">
-                <a16:creationId xmlns:a16="http://schemas.microsoft.com/office/drawing/2014/main" id="{21BAEE42-7296-45F7-B392-AF7CAD556DE2}"/>
-              </a:ext>
-            </a:extLst>
-          </p:cNvPr>
-          <p:cNvPicPr>
-            <a:picLocks noChangeAspect="1"/>
-          </p:cNvPicPr>
-          <p:nvPr/>
-        </p:nvPicPr>
-        <p:blipFill>
-          <a:blip r:embed="rId2">
-            <a:extLst>
-              <a:ext uri="{28A0092B-C50C-407E-A947-70E740481C1C}">
-                <a14:useLocalDpi xmlns:a14="http://schemas.microsoft.com/office/drawing/2010/main" val="0"/>
-              </a:ext>
-            </a:extLst>
-          </a:blip>
-          <a:stretch>
-            <a:fillRect/>
-          </a:stretch>
-        </p:blipFill>
-        <p:spPr>
-          <a:xfrm>
-            <a:off x="0" y="762000"/>
-            <a:ext cx="12192000" cy="6096000"/>
-          </a:xfrm>
-          <a:prstGeom prst="rect">
-            <a:avLst/>
-          </a:prstGeom>
-        </p:spPr>
-      </p:pic>
+            <a:pPr marL="0" indent="0">
+              <a:buNone/>
+            </a:pPr>
+            <a:r>
+              <a:rPr lang="en-US" dirty="0">
+                <a:hlinkClick r:id="rId2"/>
+              </a:rPr>
+              <a:t>Sex Differences in Regulation of Body Weight</a:t>
+            </a:r>
+            <a:r>
+              <a:rPr lang="en-US" dirty="0"/>
+              <a:t>	</a:t>
+            </a:r>
+          </a:p>
+          <a:p>
+            <a:r>
+              <a:rPr lang="en-US" dirty="0"/>
+              <a:t>Inverse relationship between estrogen levels and food intake</a:t>
+            </a:r>
+          </a:p>
+          <a:p>
+            <a:pPr lvl="1"/>
+            <a:r>
+              <a:rPr lang="en-US" dirty="0"/>
+              <a:t>Estrogen and leptin have overlapping target nuclei</a:t>
+            </a:r>
+          </a:p>
+          <a:p>
+            <a:r>
+              <a:rPr lang="en-US" dirty="0"/>
+              <a:t>Leptin levels higher in females compared to males, independent of body composition</a:t>
+            </a:r>
+          </a:p>
+          <a:p>
+            <a:pPr lvl="1"/>
+            <a:r>
+              <a:rPr lang="en-US" dirty="0"/>
+              <a:t>Increased subcutaneous fat in females vs males</a:t>
+            </a:r>
+          </a:p>
+          <a:p>
+            <a:pPr lvl="2"/>
+            <a:r>
+              <a:rPr lang="en-US" dirty="0"/>
+              <a:t>Estrogen increase lipolysis for visceral fat specifically, increasing fat in subcutaneous region</a:t>
+            </a:r>
+          </a:p>
+          <a:p>
+            <a:pPr lvl="1"/>
+            <a:r>
+              <a:rPr lang="en-US" dirty="0"/>
+              <a:t>Leptin levels inversely correlated with testosterone, positively correlated with estrogen</a:t>
+            </a:r>
+          </a:p>
+          <a:p>
+            <a:pPr lvl="1"/>
+            <a:r>
+              <a:rPr lang="en-US" dirty="0"/>
+              <a:t>In obese and aging men, there is increase conversion of testosterone to estrogen -&gt; association with increased leptin</a:t>
+            </a:r>
+          </a:p>
+          <a:p>
+            <a:pPr lvl="1"/>
+            <a:r>
+              <a:rPr lang="en-US" dirty="0"/>
+              <a:t>leptin activates sympathetic nervous system</a:t>
+            </a:r>
+          </a:p>
+        </p:txBody>
+      </p:sp>
     </p:spTree>
     <p:extLst>
       <p:ext uri="{BB962C8B-B14F-4D97-AF65-F5344CB8AC3E}">
-        <p14:creationId xmlns:p14="http://schemas.microsoft.com/office/powerpoint/2010/main" val="720251019"/>
+        <p14:creationId xmlns:p14="http://schemas.microsoft.com/office/powerpoint/2010/main" val="2621268212"/>
       </p:ext>
     </p:extLst>
   </p:cSld>
@@ -4831,7 +4815,7 @@
           <p:cNvPr id="2" name="Title 1">
             <a:extLst>
               <a:ext uri="{FF2B5EF4-FFF2-40B4-BE49-F238E27FC236}">
-                <a16:creationId xmlns:a16="http://schemas.microsoft.com/office/drawing/2014/main" id="{EDFE2337-8B87-4D25-A19D-4CFFBF605DCF}"/>
+                <a16:creationId xmlns:a16="http://schemas.microsoft.com/office/drawing/2014/main" id="{6C49716E-7F67-4809-A2CC-9E4E655F03AB}"/>
               </a:ext>
             </a:extLst>
           </p:cNvPr>
@@ -4844,7 +4828,7 @@
         </p:nvSpPr>
         <p:spPr>
           <a:xfrm>
-            <a:off x="838200" y="-206375"/>
+            <a:off x="838200" y="-297657"/>
             <a:ext cx="10515600" cy="1325563"/>
           </a:xfrm>
         </p:spPr>
@@ -4856,7 +4840,7 @@
           <a:p>
             <a:r>
               <a:rPr lang="en-US" sz="3600" dirty="0"/>
-              <a:t>Waist to Hip Ratio</a:t>
+              <a:t>BMI – Cell Types</a:t>
             </a:r>
           </a:p>
         </p:txBody>
@@ -4866,7 +4850,7 @@
           <p:cNvPr id="9" name="Picture 8" descr="Chart, bar chart&#10;&#10;Description automatically generated">
             <a:extLst>
               <a:ext uri="{FF2B5EF4-FFF2-40B4-BE49-F238E27FC236}">
-                <a16:creationId xmlns:a16="http://schemas.microsoft.com/office/drawing/2014/main" id="{87D19DC4-DAB7-4CCC-8971-EFD5A87EFE7E}"/>
+                <a16:creationId xmlns:a16="http://schemas.microsoft.com/office/drawing/2014/main" id="{6D0FDFD0-A286-4A6A-9C49-494A176BE2A7}"/>
               </a:ext>
             </a:extLst>
           </p:cNvPr>
@@ -4900,7 +4884,7 @@
     </p:spTree>
     <p:extLst>
       <p:ext uri="{BB962C8B-B14F-4D97-AF65-F5344CB8AC3E}">
-        <p14:creationId xmlns:p14="http://schemas.microsoft.com/office/powerpoint/2010/main" val="2749481319"/>
+        <p14:creationId xmlns:p14="http://schemas.microsoft.com/office/powerpoint/2010/main" val="3679050632"/>
       </p:ext>
     </p:extLst>
   </p:cSld>
@@ -4932,7 +4916,7 @@
           <p:cNvPr id="2" name="Title 1">
             <a:extLst>
               <a:ext uri="{FF2B5EF4-FFF2-40B4-BE49-F238E27FC236}">
-                <a16:creationId xmlns:a16="http://schemas.microsoft.com/office/drawing/2014/main" id="{9F9B4E10-69B5-417E-8DFF-A3D05C347608}"/>
+                <a16:creationId xmlns:a16="http://schemas.microsoft.com/office/drawing/2014/main" id="{6C49716E-7F67-4809-A2CC-9E4E655F03AB}"/>
               </a:ext>
             </a:extLst>
           </p:cNvPr>
@@ -4945,7 +4929,7 @@
         </p:nvSpPr>
         <p:spPr>
           <a:xfrm>
-            <a:off x="838200" y="-292100"/>
+            <a:off x="838200" y="-297657"/>
             <a:ext cx="10515600" cy="1325563"/>
           </a:xfrm>
         </p:spPr>
@@ -4957,17 +4941,17 @@
           <a:p>
             <a:r>
               <a:rPr lang="en-US" sz="3600" dirty="0"/>
-              <a:t>Waist to Hip Ratio (adjusted for BMI) – Cell Types</a:t>
+              <a:t>BMI – mash</a:t>
             </a:r>
           </a:p>
         </p:txBody>
       </p:sp>
       <p:pic>
         <p:nvPicPr>
-          <p:cNvPr id="9" name="Picture 8" descr="Chart, bar chart&#10;&#10;Description automatically generated">
-            <a:extLst>
-              <a:ext uri="{FF2B5EF4-FFF2-40B4-BE49-F238E27FC236}">
-                <a16:creationId xmlns:a16="http://schemas.microsoft.com/office/drawing/2014/main" id="{CBAC7284-0C03-4910-8AF2-A29FF007A917}"/>
+          <p:cNvPr id="4" name="Picture 3" descr="Chart, bar chart&#10;&#10;Description automatically generated">
+            <a:extLst>
+              <a:ext uri="{FF2B5EF4-FFF2-40B4-BE49-F238E27FC236}">
+                <a16:creationId xmlns:a16="http://schemas.microsoft.com/office/drawing/2014/main" id="{AEC6CF3F-22B4-4959-AA8B-0393452BA43D}"/>
               </a:ext>
             </a:extLst>
           </p:cNvPr>
@@ -4977,21 +4961,15 @@
           <p:nvPr/>
         </p:nvPicPr>
         <p:blipFill>
-          <a:blip r:embed="rId2">
-            <a:extLst>
-              <a:ext uri="{28A0092B-C50C-407E-A947-70E740481C1C}">
-                <a14:useLocalDpi xmlns:a14="http://schemas.microsoft.com/office/drawing/2010/main" val="0"/>
-              </a:ext>
-            </a:extLst>
-          </a:blip>
+          <a:blip r:embed="rId2"/>
           <a:stretch>
             <a:fillRect/>
           </a:stretch>
         </p:blipFill>
         <p:spPr>
           <a:xfrm>
-            <a:off x="0" y="825617"/>
-            <a:ext cx="12192000" cy="6096000"/>
+            <a:off x="0" y="701559"/>
+            <a:ext cx="12192000" cy="6091685"/>
           </a:xfrm>
           <a:prstGeom prst="rect">
             <a:avLst/>
@@ -5001,7 +4979,7 @@
     </p:spTree>
     <p:extLst>
       <p:ext uri="{BB962C8B-B14F-4D97-AF65-F5344CB8AC3E}">
-        <p14:creationId xmlns:p14="http://schemas.microsoft.com/office/powerpoint/2010/main" val="2532241004"/>
+        <p14:creationId xmlns:p14="http://schemas.microsoft.com/office/powerpoint/2010/main" val="2460645196"/>
       </p:ext>
     </p:extLst>
   </p:cSld>
@@ -5033,7 +5011,7 @@
           <p:cNvPr id="2" name="Title 1">
             <a:extLst>
               <a:ext uri="{FF2B5EF4-FFF2-40B4-BE49-F238E27FC236}">
-                <a16:creationId xmlns:a16="http://schemas.microsoft.com/office/drawing/2014/main" id="{215BB56A-8552-4D77-8488-6DE9590A398F}"/>
+                <a16:creationId xmlns:a16="http://schemas.microsoft.com/office/drawing/2014/main" id="{A6C22298-89A6-4CD0-A61A-856C5993BF45}"/>
               </a:ext>
             </a:extLst>
           </p:cNvPr>
@@ -5047,7 +5025,7 @@
         <p:spPr>
           <a:xfrm>
             <a:off x="838200" y="0"/>
-            <a:ext cx="10515600" cy="817130"/>
+            <a:ext cx="10515600" cy="724766"/>
           </a:xfrm>
         </p:spPr>
         <p:txBody>
@@ -5058,7 +5036,7 @@
           <a:p>
             <a:r>
               <a:rPr lang="en-US" sz="3600" dirty="0"/>
-              <a:t>Waist to Hip Ratio (adjusted for BMI) - </a:t>
+              <a:t>BMI - </a:t>
             </a:r>
             <a:r>
               <a:rPr lang="en-US" sz="3600" dirty="0" err="1"/>
@@ -5073,7 +5051,7 @@
           <p:cNvPr id="5" name="Content Placeholder 4" descr="Chart, bar chart&#10;&#10;Description automatically generated">
             <a:extLst>
               <a:ext uri="{FF2B5EF4-FFF2-40B4-BE49-F238E27FC236}">
-                <a16:creationId xmlns:a16="http://schemas.microsoft.com/office/drawing/2014/main" id="{9506C5A3-5D07-4C5C-94E3-C562D256E7D3}"/>
+                <a16:creationId xmlns:a16="http://schemas.microsoft.com/office/drawing/2014/main" id="{D5F1C85C-61EC-4ADE-9D48-9419FC05BF0E}"/>
               </a:ext>
             </a:extLst>
           </p:cNvPr>
@@ -5106,7 +5084,7 @@
     </p:spTree>
     <p:extLst>
       <p:ext uri="{BB962C8B-B14F-4D97-AF65-F5344CB8AC3E}">
-        <p14:creationId xmlns:p14="http://schemas.microsoft.com/office/powerpoint/2010/main" val="4025447628"/>
+        <p14:creationId xmlns:p14="http://schemas.microsoft.com/office/powerpoint/2010/main" val="74754745"/>
       </p:ext>
     </p:extLst>
   </p:cSld>
@@ -5138,6 +5116,670 @@
           <p:cNvPr id="2" name="Title 1">
             <a:extLst>
               <a:ext uri="{FF2B5EF4-FFF2-40B4-BE49-F238E27FC236}">
+                <a16:creationId xmlns:a16="http://schemas.microsoft.com/office/drawing/2014/main" id="{CE796253-6CC5-4122-8171-3A9B6CE67B7D}"/>
+              </a:ext>
+            </a:extLst>
+          </p:cNvPr>
+          <p:cNvSpPr>
+            <a:spLocks noGrp="1"/>
+          </p:cNvSpPr>
+          <p:nvPr>
+            <p:ph type="title"/>
+          </p:nvPr>
+        </p:nvSpPr>
+        <p:spPr>
+          <a:xfrm>
+            <a:off x="838200" y="-254000"/>
+            <a:ext cx="10515600" cy="1325563"/>
+          </a:xfrm>
+        </p:spPr>
+        <p:txBody>
+          <a:bodyPr>
+            <a:normAutofit/>
+          </a:bodyPr>
+          <a:lstStyle/>
+          <a:p>
+            <a:r>
+              <a:rPr lang="en-US" sz="3600" dirty="0"/>
+              <a:t>Hip Circumference</a:t>
+            </a:r>
+          </a:p>
+        </p:txBody>
+      </p:sp>
+      <p:pic>
+        <p:nvPicPr>
+          <p:cNvPr id="9" name="Picture 8" descr="Chart, bar chart&#10;&#10;Description automatically generated">
+            <a:extLst>
+              <a:ext uri="{FF2B5EF4-FFF2-40B4-BE49-F238E27FC236}">
+                <a16:creationId xmlns:a16="http://schemas.microsoft.com/office/drawing/2014/main" id="{6BAB60FB-8EDB-4F2C-B75D-B4B68ED161B0}"/>
+              </a:ext>
+            </a:extLst>
+          </p:cNvPr>
+          <p:cNvPicPr>
+            <a:picLocks noChangeAspect="1"/>
+          </p:cNvPicPr>
+          <p:nvPr/>
+        </p:nvPicPr>
+        <p:blipFill>
+          <a:blip r:embed="rId2">
+            <a:extLst>
+              <a:ext uri="{28A0092B-C50C-407E-A947-70E740481C1C}">
+                <a14:useLocalDpi xmlns:a14="http://schemas.microsoft.com/office/drawing/2010/main" val="0"/>
+              </a:ext>
+            </a:extLst>
+          </a:blip>
+          <a:stretch>
+            <a:fillRect/>
+          </a:stretch>
+        </p:blipFill>
+        <p:spPr>
+          <a:xfrm>
+            <a:off x="0" y="762000"/>
+            <a:ext cx="12192000" cy="6096000"/>
+          </a:xfrm>
+          <a:prstGeom prst="rect">
+            <a:avLst/>
+          </a:prstGeom>
+        </p:spPr>
+      </p:pic>
+    </p:spTree>
+    <p:extLst>
+      <p:ext uri="{BB962C8B-B14F-4D97-AF65-F5344CB8AC3E}">
+        <p14:creationId xmlns:p14="http://schemas.microsoft.com/office/powerpoint/2010/main" val="1232925332"/>
+      </p:ext>
+    </p:extLst>
+  </p:cSld>
+  <p:clrMapOvr>
+    <a:masterClrMapping/>
+  </p:clrMapOvr>
+</p:sld>
+</file>
+
+<file path=ppt/slides/slide26.xml><?xml version="1.0" encoding="utf-8"?>
+<p:sld xmlns:a="http://schemas.openxmlformats.org/drawingml/2006/main" xmlns:r="http://schemas.openxmlformats.org/officeDocument/2006/relationships" xmlns:p="http://schemas.openxmlformats.org/presentationml/2006/main">
+  <p:cSld>
+    <p:spTree>
+      <p:nvGrpSpPr>
+        <p:cNvPr id="1" name=""/>
+        <p:cNvGrpSpPr/>
+        <p:nvPr/>
+      </p:nvGrpSpPr>
+      <p:grpSpPr>
+        <a:xfrm>
+          <a:off x="0" y="0"/>
+          <a:ext cx="0" cy="0"/>
+          <a:chOff x="0" y="0"/>
+          <a:chExt cx="0" cy="0"/>
+        </a:xfrm>
+      </p:grpSpPr>
+      <p:sp>
+        <p:nvSpPr>
+          <p:cNvPr id="2" name="Title 1">
+            <a:extLst>
+              <a:ext uri="{FF2B5EF4-FFF2-40B4-BE49-F238E27FC236}">
+                <a16:creationId xmlns:a16="http://schemas.microsoft.com/office/drawing/2014/main" id="{CE796253-6CC5-4122-8171-3A9B6CE67B7D}"/>
+              </a:ext>
+            </a:extLst>
+          </p:cNvPr>
+          <p:cNvSpPr>
+            <a:spLocks noGrp="1"/>
+          </p:cNvSpPr>
+          <p:nvPr>
+            <p:ph type="title"/>
+          </p:nvPr>
+        </p:nvSpPr>
+        <p:spPr>
+          <a:xfrm>
+            <a:off x="838200" y="-349250"/>
+            <a:ext cx="10515600" cy="1325563"/>
+          </a:xfrm>
+        </p:spPr>
+        <p:txBody>
+          <a:bodyPr>
+            <a:normAutofit/>
+          </a:bodyPr>
+          <a:lstStyle/>
+          <a:p>
+            <a:r>
+              <a:rPr lang="en-US" sz="3600" dirty="0"/>
+              <a:t>Waist Circumference</a:t>
+            </a:r>
+          </a:p>
+        </p:txBody>
+      </p:sp>
+      <p:pic>
+        <p:nvPicPr>
+          <p:cNvPr id="11" name="Picture 10" descr="Chart, bar chart&#10;&#10;Description automatically generated">
+            <a:extLst>
+              <a:ext uri="{FF2B5EF4-FFF2-40B4-BE49-F238E27FC236}">
+                <a16:creationId xmlns:a16="http://schemas.microsoft.com/office/drawing/2014/main" id="{21BAEE42-7296-45F7-B392-AF7CAD556DE2}"/>
+              </a:ext>
+            </a:extLst>
+          </p:cNvPr>
+          <p:cNvPicPr>
+            <a:picLocks noChangeAspect="1"/>
+          </p:cNvPicPr>
+          <p:nvPr/>
+        </p:nvPicPr>
+        <p:blipFill>
+          <a:blip r:embed="rId2">
+            <a:extLst>
+              <a:ext uri="{28A0092B-C50C-407E-A947-70E740481C1C}">
+                <a14:useLocalDpi xmlns:a14="http://schemas.microsoft.com/office/drawing/2010/main" val="0"/>
+              </a:ext>
+            </a:extLst>
+          </a:blip>
+          <a:stretch>
+            <a:fillRect/>
+          </a:stretch>
+        </p:blipFill>
+        <p:spPr>
+          <a:xfrm>
+            <a:off x="0" y="762000"/>
+            <a:ext cx="12192000" cy="6096000"/>
+          </a:xfrm>
+          <a:prstGeom prst="rect">
+            <a:avLst/>
+          </a:prstGeom>
+        </p:spPr>
+      </p:pic>
+    </p:spTree>
+    <p:extLst>
+      <p:ext uri="{BB962C8B-B14F-4D97-AF65-F5344CB8AC3E}">
+        <p14:creationId xmlns:p14="http://schemas.microsoft.com/office/powerpoint/2010/main" val="720251019"/>
+      </p:ext>
+    </p:extLst>
+  </p:cSld>
+  <p:clrMapOvr>
+    <a:masterClrMapping/>
+  </p:clrMapOvr>
+</p:sld>
+</file>
+
+<file path=ppt/slides/slide27.xml><?xml version="1.0" encoding="utf-8"?>
+<p:sld xmlns:a="http://schemas.openxmlformats.org/drawingml/2006/main" xmlns:r="http://schemas.openxmlformats.org/officeDocument/2006/relationships" xmlns:p="http://schemas.openxmlformats.org/presentationml/2006/main">
+  <p:cSld>
+    <p:spTree>
+      <p:nvGrpSpPr>
+        <p:cNvPr id="1" name=""/>
+        <p:cNvGrpSpPr/>
+        <p:nvPr/>
+      </p:nvGrpSpPr>
+      <p:grpSpPr>
+        <a:xfrm>
+          <a:off x="0" y="0"/>
+          <a:ext cx="0" cy="0"/>
+          <a:chOff x="0" y="0"/>
+          <a:chExt cx="0" cy="0"/>
+        </a:xfrm>
+      </p:grpSpPr>
+      <p:sp>
+        <p:nvSpPr>
+          <p:cNvPr id="2" name="Title 1">
+            <a:extLst>
+              <a:ext uri="{FF2B5EF4-FFF2-40B4-BE49-F238E27FC236}">
+                <a16:creationId xmlns:a16="http://schemas.microsoft.com/office/drawing/2014/main" id="{EDFE2337-8B87-4D25-A19D-4CFFBF605DCF}"/>
+              </a:ext>
+            </a:extLst>
+          </p:cNvPr>
+          <p:cNvSpPr>
+            <a:spLocks noGrp="1"/>
+          </p:cNvSpPr>
+          <p:nvPr>
+            <p:ph type="title"/>
+          </p:nvPr>
+        </p:nvSpPr>
+        <p:spPr>
+          <a:xfrm>
+            <a:off x="838200" y="-206375"/>
+            <a:ext cx="10515600" cy="1325563"/>
+          </a:xfrm>
+        </p:spPr>
+        <p:txBody>
+          <a:bodyPr>
+            <a:normAutofit/>
+          </a:bodyPr>
+          <a:lstStyle/>
+          <a:p>
+            <a:r>
+              <a:rPr lang="en-US" sz="3600" dirty="0"/>
+              <a:t>Waist to Hip Ratio</a:t>
+            </a:r>
+          </a:p>
+        </p:txBody>
+      </p:sp>
+      <p:pic>
+        <p:nvPicPr>
+          <p:cNvPr id="9" name="Picture 8" descr="Chart, bar chart&#10;&#10;Description automatically generated">
+            <a:extLst>
+              <a:ext uri="{FF2B5EF4-FFF2-40B4-BE49-F238E27FC236}">
+                <a16:creationId xmlns:a16="http://schemas.microsoft.com/office/drawing/2014/main" id="{87D19DC4-DAB7-4CCC-8971-EFD5A87EFE7E}"/>
+              </a:ext>
+            </a:extLst>
+          </p:cNvPr>
+          <p:cNvPicPr>
+            <a:picLocks noChangeAspect="1"/>
+          </p:cNvPicPr>
+          <p:nvPr/>
+        </p:nvPicPr>
+        <p:blipFill>
+          <a:blip r:embed="rId2">
+            <a:extLst>
+              <a:ext uri="{28A0092B-C50C-407E-A947-70E740481C1C}">
+                <a14:useLocalDpi xmlns:a14="http://schemas.microsoft.com/office/drawing/2010/main" val="0"/>
+              </a:ext>
+            </a:extLst>
+          </a:blip>
+          <a:stretch>
+            <a:fillRect/>
+          </a:stretch>
+        </p:blipFill>
+        <p:spPr>
+          <a:xfrm>
+            <a:off x="0" y="762000"/>
+            <a:ext cx="12192000" cy="6096000"/>
+          </a:xfrm>
+          <a:prstGeom prst="rect">
+            <a:avLst/>
+          </a:prstGeom>
+        </p:spPr>
+      </p:pic>
+    </p:spTree>
+    <p:extLst>
+      <p:ext uri="{BB962C8B-B14F-4D97-AF65-F5344CB8AC3E}">
+        <p14:creationId xmlns:p14="http://schemas.microsoft.com/office/powerpoint/2010/main" val="2749481319"/>
+      </p:ext>
+    </p:extLst>
+  </p:cSld>
+  <p:clrMapOvr>
+    <a:masterClrMapping/>
+  </p:clrMapOvr>
+</p:sld>
+</file>
+
+<file path=ppt/slides/slide28.xml><?xml version="1.0" encoding="utf-8"?>
+<p:sld xmlns:a="http://schemas.openxmlformats.org/drawingml/2006/main" xmlns:r="http://schemas.openxmlformats.org/officeDocument/2006/relationships" xmlns:p="http://schemas.openxmlformats.org/presentationml/2006/main">
+  <p:cSld>
+    <p:spTree>
+      <p:nvGrpSpPr>
+        <p:cNvPr id="1" name=""/>
+        <p:cNvGrpSpPr/>
+        <p:nvPr/>
+      </p:nvGrpSpPr>
+      <p:grpSpPr>
+        <a:xfrm>
+          <a:off x="0" y="0"/>
+          <a:ext cx="0" cy="0"/>
+          <a:chOff x="0" y="0"/>
+          <a:chExt cx="0" cy="0"/>
+        </a:xfrm>
+      </p:grpSpPr>
+      <p:sp>
+        <p:nvSpPr>
+          <p:cNvPr id="2" name="Title 1">
+            <a:extLst>
+              <a:ext uri="{FF2B5EF4-FFF2-40B4-BE49-F238E27FC236}">
+                <a16:creationId xmlns:a16="http://schemas.microsoft.com/office/drawing/2014/main" id="{9F9B4E10-69B5-417E-8DFF-A3D05C347608}"/>
+              </a:ext>
+            </a:extLst>
+          </p:cNvPr>
+          <p:cNvSpPr>
+            <a:spLocks noGrp="1"/>
+          </p:cNvSpPr>
+          <p:nvPr>
+            <p:ph type="title"/>
+          </p:nvPr>
+        </p:nvSpPr>
+        <p:spPr>
+          <a:xfrm>
+            <a:off x="838200" y="-292100"/>
+            <a:ext cx="10515600" cy="1325563"/>
+          </a:xfrm>
+        </p:spPr>
+        <p:txBody>
+          <a:bodyPr>
+            <a:normAutofit/>
+          </a:bodyPr>
+          <a:lstStyle/>
+          <a:p>
+            <a:r>
+              <a:rPr lang="en-US" sz="3600" dirty="0"/>
+              <a:t>Waist to Hip Ratio (adjusted for BMI) – Cell Types</a:t>
+            </a:r>
+          </a:p>
+        </p:txBody>
+      </p:sp>
+      <p:pic>
+        <p:nvPicPr>
+          <p:cNvPr id="9" name="Picture 8" descr="Chart, bar chart&#10;&#10;Description automatically generated">
+            <a:extLst>
+              <a:ext uri="{FF2B5EF4-FFF2-40B4-BE49-F238E27FC236}">
+                <a16:creationId xmlns:a16="http://schemas.microsoft.com/office/drawing/2014/main" id="{CBAC7284-0C03-4910-8AF2-A29FF007A917}"/>
+              </a:ext>
+            </a:extLst>
+          </p:cNvPr>
+          <p:cNvPicPr>
+            <a:picLocks noChangeAspect="1"/>
+          </p:cNvPicPr>
+          <p:nvPr/>
+        </p:nvPicPr>
+        <p:blipFill>
+          <a:blip r:embed="rId2">
+            <a:extLst>
+              <a:ext uri="{28A0092B-C50C-407E-A947-70E740481C1C}">
+                <a14:useLocalDpi xmlns:a14="http://schemas.microsoft.com/office/drawing/2010/main" val="0"/>
+              </a:ext>
+            </a:extLst>
+          </a:blip>
+          <a:stretch>
+            <a:fillRect/>
+          </a:stretch>
+        </p:blipFill>
+        <p:spPr>
+          <a:xfrm>
+            <a:off x="0" y="825617"/>
+            <a:ext cx="12192000" cy="6096000"/>
+          </a:xfrm>
+          <a:prstGeom prst="rect">
+            <a:avLst/>
+          </a:prstGeom>
+        </p:spPr>
+      </p:pic>
+    </p:spTree>
+    <p:extLst>
+      <p:ext uri="{BB962C8B-B14F-4D97-AF65-F5344CB8AC3E}">
+        <p14:creationId xmlns:p14="http://schemas.microsoft.com/office/powerpoint/2010/main" val="2532241004"/>
+      </p:ext>
+    </p:extLst>
+  </p:cSld>
+  <p:clrMapOvr>
+    <a:masterClrMapping/>
+  </p:clrMapOvr>
+</p:sld>
+</file>
+
+<file path=ppt/slides/slide29.xml><?xml version="1.0" encoding="utf-8"?>
+<p:sld xmlns:a="http://schemas.openxmlformats.org/drawingml/2006/main" xmlns:r="http://schemas.openxmlformats.org/officeDocument/2006/relationships" xmlns:p="http://schemas.openxmlformats.org/presentationml/2006/main">
+  <p:cSld>
+    <p:spTree>
+      <p:nvGrpSpPr>
+        <p:cNvPr id="1" name=""/>
+        <p:cNvGrpSpPr/>
+        <p:nvPr/>
+      </p:nvGrpSpPr>
+      <p:grpSpPr>
+        <a:xfrm>
+          <a:off x="0" y="0"/>
+          <a:ext cx="0" cy="0"/>
+          <a:chOff x="0" y="0"/>
+          <a:chExt cx="0" cy="0"/>
+        </a:xfrm>
+      </p:grpSpPr>
+      <p:sp>
+        <p:nvSpPr>
+          <p:cNvPr id="2" name="Title 1">
+            <a:extLst>
+              <a:ext uri="{FF2B5EF4-FFF2-40B4-BE49-F238E27FC236}">
+                <a16:creationId xmlns:a16="http://schemas.microsoft.com/office/drawing/2014/main" id="{9F9B4E10-69B5-417E-8DFF-A3D05C347608}"/>
+              </a:ext>
+            </a:extLst>
+          </p:cNvPr>
+          <p:cNvSpPr>
+            <a:spLocks noGrp="1"/>
+          </p:cNvSpPr>
+          <p:nvPr>
+            <p:ph type="title"/>
+          </p:nvPr>
+        </p:nvSpPr>
+        <p:spPr>
+          <a:xfrm>
+            <a:off x="838200" y="-292100"/>
+            <a:ext cx="10515600" cy="1325563"/>
+          </a:xfrm>
+        </p:spPr>
+        <p:txBody>
+          <a:bodyPr>
+            <a:normAutofit/>
+          </a:bodyPr>
+          <a:lstStyle/>
+          <a:p>
+            <a:r>
+              <a:rPr lang="en-US" sz="3600" dirty="0"/>
+              <a:t>Waist to Hip Ratio (adjusted for BMI) – Cell Types - mash</a:t>
+            </a:r>
+          </a:p>
+        </p:txBody>
+      </p:sp>
+      <p:pic>
+        <p:nvPicPr>
+          <p:cNvPr id="4" name="Picture 3" descr="Chart, bar chart&#10;&#10;Description automatically generated">
+            <a:extLst>
+              <a:ext uri="{FF2B5EF4-FFF2-40B4-BE49-F238E27FC236}">
+                <a16:creationId xmlns:a16="http://schemas.microsoft.com/office/drawing/2014/main" id="{28FE3A5F-6B57-4795-B889-A598C6F170E4}"/>
+              </a:ext>
+            </a:extLst>
+          </p:cNvPr>
+          <p:cNvPicPr>
+            <a:picLocks noChangeAspect="1"/>
+          </p:cNvPicPr>
+          <p:nvPr/>
+        </p:nvPicPr>
+        <p:blipFill>
+          <a:blip r:embed="rId2"/>
+          <a:stretch>
+            <a:fillRect/>
+          </a:stretch>
+        </p:blipFill>
+        <p:spPr>
+          <a:xfrm>
+            <a:off x="-1" y="704735"/>
+            <a:ext cx="12181813" cy="6086590"/>
+          </a:xfrm>
+          <a:prstGeom prst="rect">
+            <a:avLst/>
+          </a:prstGeom>
+        </p:spPr>
+      </p:pic>
+    </p:spTree>
+    <p:extLst>
+      <p:ext uri="{BB962C8B-B14F-4D97-AF65-F5344CB8AC3E}">
+        <p14:creationId xmlns:p14="http://schemas.microsoft.com/office/powerpoint/2010/main" val="1540147698"/>
+      </p:ext>
+    </p:extLst>
+  </p:cSld>
+  <p:clrMapOvr>
+    <a:masterClrMapping/>
+  </p:clrMapOvr>
+</p:sld>
+</file>
+
+<file path=ppt/slides/slide3.xml><?xml version="1.0" encoding="utf-8"?>
+<p:sld xmlns:a="http://schemas.openxmlformats.org/drawingml/2006/main" xmlns:r="http://schemas.openxmlformats.org/officeDocument/2006/relationships" xmlns:p="http://schemas.openxmlformats.org/presentationml/2006/main">
+  <p:cSld>
+    <p:spTree>
+      <p:nvGrpSpPr>
+        <p:cNvPr id="1" name=""/>
+        <p:cNvGrpSpPr/>
+        <p:nvPr/>
+      </p:nvGrpSpPr>
+      <p:grpSpPr>
+        <a:xfrm>
+          <a:off x="0" y="0"/>
+          <a:ext cx="0" cy="0"/>
+          <a:chOff x="0" y="0"/>
+          <a:chExt cx="0" cy="0"/>
+        </a:xfrm>
+      </p:grpSpPr>
+      <p:pic>
+        <p:nvPicPr>
+          <p:cNvPr id="4" name="Picture 3" descr="A picture containing text&#10;&#10;Description automatically generated">
+            <a:extLst>
+              <a:ext uri="{FF2B5EF4-FFF2-40B4-BE49-F238E27FC236}">
+                <a16:creationId xmlns:a16="http://schemas.microsoft.com/office/drawing/2014/main" id="{88FA4695-9B71-4455-A73A-2E419C6E2BD3}"/>
+              </a:ext>
+            </a:extLst>
+          </p:cNvPr>
+          <p:cNvPicPr>
+            <a:picLocks noChangeAspect="1"/>
+          </p:cNvPicPr>
+          <p:nvPr/>
+        </p:nvPicPr>
+        <p:blipFill>
+          <a:blip r:embed="rId2"/>
+          <a:stretch>
+            <a:fillRect/>
+          </a:stretch>
+        </p:blipFill>
+        <p:spPr>
+          <a:xfrm>
+            <a:off x="177567" y="0"/>
+            <a:ext cx="11836866" cy="6877439"/>
+          </a:xfrm>
+          <a:prstGeom prst="rect">
+            <a:avLst/>
+          </a:prstGeom>
+        </p:spPr>
+      </p:pic>
+    </p:spTree>
+    <p:extLst>
+      <p:ext uri="{BB962C8B-B14F-4D97-AF65-F5344CB8AC3E}">
+        <p14:creationId xmlns:p14="http://schemas.microsoft.com/office/powerpoint/2010/main" val="2825892457"/>
+      </p:ext>
+    </p:extLst>
+  </p:cSld>
+  <p:clrMapOvr>
+    <a:masterClrMapping/>
+  </p:clrMapOvr>
+</p:sld>
+</file>
+
+<file path=ppt/slides/slide30.xml><?xml version="1.0" encoding="utf-8"?>
+<p:sld xmlns:a="http://schemas.openxmlformats.org/drawingml/2006/main" xmlns:r="http://schemas.openxmlformats.org/officeDocument/2006/relationships" xmlns:p="http://schemas.openxmlformats.org/presentationml/2006/main">
+  <p:cSld>
+    <p:spTree>
+      <p:nvGrpSpPr>
+        <p:cNvPr id="1" name=""/>
+        <p:cNvGrpSpPr/>
+        <p:nvPr/>
+      </p:nvGrpSpPr>
+      <p:grpSpPr>
+        <a:xfrm>
+          <a:off x="0" y="0"/>
+          <a:ext cx="0" cy="0"/>
+          <a:chOff x="0" y="0"/>
+          <a:chExt cx="0" cy="0"/>
+        </a:xfrm>
+      </p:grpSpPr>
+      <p:sp>
+        <p:nvSpPr>
+          <p:cNvPr id="2" name="Title 1">
+            <a:extLst>
+              <a:ext uri="{FF2B5EF4-FFF2-40B4-BE49-F238E27FC236}">
+                <a16:creationId xmlns:a16="http://schemas.microsoft.com/office/drawing/2014/main" id="{215BB56A-8552-4D77-8488-6DE9590A398F}"/>
+              </a:ext>
+            </a:extLst>
+          </p:cNvPr>
+          <p:cNvSpPr>
+            <a:spLocks noGrp="1"/>
+          </p:cNvSpPr>
+          <p:nvPr>
+            <p:ph type="title"/>
+          </p:nvPr>
+        </p:nvSpPr>
+        <p:spPr>
+          <a:xfrm>
+            <a:off x="838200" y="0"/>
+            <a:ext cx="10515600" cy="817130"/>
+          </a:xfrm>
+        </p:spPr>
+        <p:txBody>
+          <a:bodyPr>
+            <a:normAutofit/>
+          </a:bodyPr>
+          <a:lstStyle/>
+          <a:p>
+            <a:r>
+              <a:rPr lang="en-US" sz="3600" dirty="0"/>
+              <a:t>Waist to Hip Ratio (adjusted for BMI) - </a:t>
+            </a:r>
+            <a:r>
+              <a:rPr lang="en-US" sz="3600" dirty="0" err="1"/>
+              <a:t>GTEx</a:t>
+            </a:r>
+            <a:endParaRPr lang="en-US" sz="3600" dirty="0"/>
+          </a:p>
+        </p:txBody>
+      </p:sp>
+      <p:pic>
+        <p:nvPicPr>
+          <p:cNvPr id="5" name="Content Placeholder 4" descr="Chart, bar chart&#10;&#10;Description automatically generated">
+            <a:extLst>
+              <a:ext uri="{FF2B5EF4-FFF2-40B4-BE49-F238E27FC236}">
+                <a16:creationId xmlns:a16="http://schemas.microsoft.com/office/drawing/2014/main" id="{9506C5A3-5D07-4C5C-94E3-C562D256E7D3}"/>
+              </a:ext>
+            </a:extLst>
+          </p:cNvPr>
+          <p:cNvPicPr>
+            <a:picLocks noGrp="1" noChangeAspect="1"/>
+          </p:cNvPicPr>
+          <p:nvPr>
+            <p:ph idx="1"/>
+          </p:nvPr>
+        </p:nvPicPr>
+        <p:blipFill>
+          <a:blip r:embed="rId2">
+            <a:extLst>
+              <a:ext uri="{28A0092B-C50C-407E-A947-70E740481C1C}">
+                <a14:useLocalDpi xmlns:a14="http://schemas.microsoft.com/office/drawing/2010/main" val="0"/>
+              </a:ext>
+            </a:extLst>
+          </a:blip>
+          <a:stretch>
+            <a:fillRect/>
+          </a:stretch>
+        </p:blipFill>
+        <p:spPr>
+          <a:xfrm>
+            <a:off x="0" y="762000"/>
+            <a:ext cx="12192000" cy="6096000"/>
+          </a:xfrm>
+        </p:spPr>
+      </p:pic>
+    </p:spTree>
+    <p:extLst>
+      <p:ext uri="{BB962C8B-B14F-4D97-AF65-F5344CB8AC3E}">
+        <p14:creationId xmlns:p14="http://schemas.microsoft.com/office/powerpoint/2010/main" val="4025447628"/>
+      </p:ext>
+    </p:extLst>
+  </p:cSld>
+  <p:clrMapOvr>
+    <a:masterClrMapping/>
+  </p:clrMapOvr>
+</p:sld>
+</file>
+
+<file path=ppt/slides/slide31.xml><?xml version="1.0" encoding="utf-8"?>
+<p:sld xmlns:a="http://schemas.openxmlformats.org/drawingml/2006/main" xmlns:r="http://schemas.openxmlformats.org/officeDocument/2006/relationships" xmlns:p="http://schemas.openxmlformats.org/presentationml/2006/main">
+  <p:cSld>
+    <p:spTree>
+      <p:nvGrpSpPr>
+        <p:cNvPr id="1" name=""/>
+        <p:cNvGrpSpPr/>
+        <p:nvPr/>
+      </p:nvGrpSpPr>
+      <p:grpSpPr>
+        <a:xfrm>
+          <a:off x="0" y="0"/>
+          <a:ext cx="0" cy="0"/>
+          <a:chOff x="0" y="0"/>
+          <a:chExt cx="0" cy="0"/>
+        </a:xfrm>
+      </p:grpSpPr>
+      <p:sp>
+        <p:nvSpPr>
+          <p:cNvPr id="2" name="Title 1">
+            <a:extLst>
+              <a:ext uri="{FF2B5EF4-FFF2-40B4-BE49-F238E27FC236}">
                 <a16:creationId xmlns:a16="http://schemas.microsoft.com/office/drawing/2014/main" id="{24239493-242D-4B8A-8BC9-85BC4707F253}"/>
               </a:ext>
             </a:extLst>
@@ -5233,7 +5875,7 @@
 </p:sld>
 </file>
 
-<file path=ppt/slides/slide26.xml><?xml version="1.0" encoding="utf-8"?>
+<file path=ppt/slides/slide32.xml><?xml version="1.0" encoding="utf-8"?>
 <p:sld xmlns:a="http://schemas.openxmlformats.org/drawingml/2006/main" xmlns:r="http://schemas.openxmlformats.org/officeDocument/2006/relationships" xmlns:p="http://schemas.openxmlformats.org/presentationml/2006/main">
   <p:cSld>
     <p:spTree>
@@ -6820,7 +7462,7 @@
 </p:sld>
 </file>
 
-<file path=ppt/slides/slide27.xml><?xml version="1.0" encoding="utf-8"?>
+<file path=ppt/slides/slide33.xml><?xml version="1.0" encoding="utf-8"?>
 <p:sld xmlns:a="http://schemas.openxmlformats.org/drawingml/2006/main" xmlns:r="http://schemas.openxmlformats.org/officeDocument/2006/relationships" xmlns:p="http://schemas.openxmlformats.org/presentationml/2006/main">
   <p:cSld>
     <p:spTree>
@@ -7110,7 +7752,7 @@
 </p:sld>
 </file>
 
-<file path=ppt/slides/slide28.xml><?xml version="1.0" encoding="utf-8"?>
+<file path=ppt/slides/slide34.xml><?xml version="1.0" encoding="utf-8"?>
 <p:sld xmlns:a="http://schemas.openxmlformats.org/drawingml/2006/main" xmlns:r="http://schemas.openxmlformats.org/officeDocument/2006/relationships" xmlns:p="http://schemas.openxmlformats.org/presentationml/2006/main">
   <p:cSld>
     <p:spTree>
@@ -7400,7 +8042,7 @@
 </p:sld>
 </file>
 
-<file path=ppt/slides/slide29.xml><?xml version="1.0" encoding="utf-8"?>
+<file path=ppt/slides/slide35.xml><?xml version="1.0" encoding="utf-8"?>
 <p:sld xmlns:a="http://schemas.openxmlformats.org/drawingml/2006/main" xmlns:r="http://schemas.openxmlformats.org/officeDocument/2006/relationships" xmlns:p="http://schemas.openxmlformats.org/presentationml/2006/main">
   <p:cSld>
     <p:spTree>
@@ -7681,66 +8323,6 @@
     <p:extLst>
       <p:ext uri="{BB962C8B-B14F-4D97-AF65-F5344CB8AC3E}">
         <p14:creationId xmlns:p14="http://schemas.microsoft.com/office/powerpoint/2010/main" val="2202159981"/>
-      </p:ext>
-    </p:extLst>
-  </p:cSld>
-  <p:clrMapOvr>
-    <a:masterClrMapping/>
-  </p:clrMapOvr>
-</p:sld>
-</file>
-
-<file path=ppt/slides/slide3.xml><?xml version="1.0" encoding="utf-8"?>
-<p:sld xmlns:a="http://schemas.openxmlformats.org/drawingml/2006/main" xmlns:r="http://schemas.openxmlformats.org/officeDocument/2006/relationships" xmlns:p="http://schemas.openxmlformats.org/presentationml/2006/main">
-  <p:cSld>
-    <p:spTree>
-      <p:nvGrpSpPr>
-        <p:cNvPr id="1" name=""/>
-        <p:cNvGrpSpPr/>
-        <p:nvPr/>
-      </p:nvGrpSpPr>
-      <p:grpSpPr>
-        <a:xfrm>
-          <a:off x="0" y="0"/>
-          <a:ext cx="0" cy="0"/>
-          <a:chOff x="0" y="0"/>
-          <a:chExt cx="0" cy="0"/>
-        </a:xfrm>
-      </p:grpSpPr>
-      <p:pic>
-        <p:nvPicPr>
-          <p:cNvPr id="4" name="Picture 3" descr="A picture containing text&#10;&#10;Description automatically generated">
-            <a:extLst>
-              <a:ext uri="{FF2B5EF4-FFF2-40B4-BE49-F238E27FC236}">
-                <a16:creationId xmlns:a16="http://schemas.microsoft.com/office/drawing/2014/main" id="{88FA4695-9B71-4455-A73A-2E419C6E2BD3}"/>
-              </a:ext>
-            </a:extLst>
-          </p:cNvPr>
-          <p:cNvPicPr>
-            <a:picLocks noChangeAspect="1"/>
-          </p:cNvPicPr>
-          <p:nvPr/>
-        </p:nvPicPr>
-        <p:blipFill>
-          <a:blip r:embed="rId2"/>
-          <a:stretch>
-            <a:fillRect/>
-          </a:stretch>
-        </p:blipFill>
-        <p:spPr>
-          <a:xfrm>
-            <a:off x="177567" y="0"/>
-            <a:ext cx="11836866" cy="6877439"/>
-          </a:xfrm>
-          <a:prstGeom prst="rect">
-            <a:avLst/>
-          </a:prstGeom>
-        </p:spPr>
-      </p:pic>
-    </p:spTree>
-    <p:extLst>
-      <p:ext uri="{BB962C8B-B14F-4D97-AF65-F5344CB8AC3E}">
-        <p14:creationId xmlns:p14="http://schemas.microsoft.com/office/powerpoint/2010/main" val="2825892457"/>
       </p:ext>
     </p:extLst>
   </p:cSld>
@@ -8241,8 +8823,8 @@
         </p:nvSpPr>
         <p:spPr>
           <a:xfrm>
-            <a:off x="838200" y="-244475"/>
-            <a:ext cx="10515600" cy="1325563"/>
+            <a:off x="838200" y="50800"/>
+            <a:ext cx="10515600" cy="711200"/>
           </a:xfrm>
         </p:spPr>
         <p:txBody>
@@ -8253,17 +8835,17 @@
           <a:p>
             <a:r>
               <a:rPr lang="en-US" sz="3600" dirty="0"/>
-              <a:t>Diastolic Blood Pressure</a:t>
+              <a:t>Systolic Blood Pressure - mash</a:t>
             </a:r>
           </a:p>
         </p:txBody>
       </p:sp>
       <p:pic>
         <p:nvPicPr>
-          <p:cNvPr id="9" name="Picture 8" descr="Chart, bar chart&#10;&#10;Description automatically generated">
-            <a:extLst>
-              <a:ext uri="{FF2B5EF4-FFF2-40B4-BE49-F238E27FC236}">
-                <a16:creationId xmlns:a16="http://schemas.microsoft.com/office/drawing/2014/main" id="{FA1EE28F-C14C-4576-B085-59B461A00E1E}"/>
+          <p:cNvPr id="4" name="Picture 3" descr="Chart, bar chart&#10;&#10;Description automatically generated">
+            <a:extLst>
+              <a:ext uri="{FF2B5EF4-FFF2-40B4-BE49-F238E27FC236}">
+                <a16:creationId xmlns:a16="http://schemas.microsoft.com/office/drawing/2014/main" id="{4EF91956-32AA-4447-A13B-9F4BCA97FF70}"/>
               </a:ext>
             </a:extLst>
           </p:cNvPr>
@@ -8273,21 +8855,15 @@
           <p:nvPr/>
         </p:nvPicPr>
         <p:blipFill>
-          <a:blip r:embed="rId2">
-            <a:extLst>
-              <a:ext uri="{28A0092B-C50C-407E-A947-70E740481C1C}">
-                <a14:useLocalDpi xmlns:a14="http://schemas.microsoft.com/office/drawing/2010/main" val="0"/>
-              </a:ext>
-            </a:extLst>
-          </a:blip>
+          <a:blip r:embed="rId2"/>
           <a:stretch>
             <a:fillRect/>
           </a:stretch>
         </p:blipFill>
         <p:spPr>
           <a:xfrm>
-            <a:off x="0" y="762000"/>
-            <a:ext cx="12192000" cy="6096000"/>
+            <a:off x="72794" y="761999"/>
+            <a:ext cx="12119205" cy="6063897"/>
           </a:xfrm>
           <a:prstGeom prst="rect">
             <a:avLst/>
@@ -8297,7 +8873,7 @@
     </p:spTree>
     <p:extLst>
       <p:ext uri="{BB962C8B-B14F-4D97-AF65-F5344CB8AC3E}">
-        <p14:creationId xmlns:p14="http://schemas.microsoft.com/office/powerpoint/2010/main" val="777379417"/>
+        <p14:creationId xmlns:p14="http://schemas.microsoft.com/office/powerpoint/2010/main" val="1565032612"/>
       </p:ext>
     </p:extLst>
   </p:cSld>

</xml_diff>